<commit_message>
Final Updated Project Proposal
</commit_message>
<xml_diff>
--- a/Project Proposal Group 3.pptx
+++ b/Project Proposal Group 3.pptx
@@ -170,213 +170,6 @@
 </p1510:revInfo>
 </file>
 
-<file path=ppt/changesInfos/changesInfo1.xml><?xml version="1.0" encoding="utf-8"?>
-<pc:chgInfo xmlns:a="http://schemas.openxmlformats.org/drawingml/2006/main" xmlns:r="http://schemas.openxmlformats.org/officeDocument/2006/relationships" xmlns:ac="http://schemas.microsoft.com/office/drawing/2013/main/command" xmlns:pc="http://schemas.microsoft.com/office/powerpoint/2013/main/command">
-  <pc:docChgLst>
-    <pc:chgData name="Hitarth Mehta" userId="S::w0776103@myscc.ca::9bf5ce78-54ad-458f-b6f9-c562b1e9b62f" providerId="AD" clId="Web-{A79DD57E-47A2-4538-A0C2-DAE60C7F0CB9}"/>
-    <pc:docChg chg="addSld delSld modSld">
-      <pc:chgData name="Hitarth Mehta" userId="S::w0776103@myscc.ca::9bf5ce78-54ad-458f-b6f9-c562b1e9b62f" providerId="AD" clId="Web-{A79DD57E-47A2-4538-A0C2-DAE60C7F0CB9}" dt="2021-06-29T20:35:46.237" v="45"/>
-      <pc:docMkLst>
-        <pc:docMk/>
-      </pc:docMkLst>
-      <pc:sldChg chg="del">
-        <pc:chgData name="Hitarth Mehta" userId="S::w0776103@myscc.ca::9bf5ce78-54ad-458f-b6f9-c562b1e9b62f" providerId="AD" clId="Web-{A79DD57E-47A2-4538-A0C2-DAE60C7F0CB9}" dt="2021-06-29T20:34:06.205" v="21"/>
-        <pc:sldMkLst>
-          <pc:docMk/>
-          <pc:sldMk cId="0" sldId="259"/>
-        </pc:sldMkLst>
-      </pc:sldChg>
-      <pc:sldChg chg="add del">
-        <pc:chgData name="Hitarth Mehta" userId="S::w0776103@myscc.ca::9bf5ce78-54ad-458f-b6f9-c562b1e9b62f" providerId="AD" clId="Web-{A79DD57E-47A2-4538-A0C2-DAE60C7F0CB9}" dt="2021-06-29T20:28:09.611" v="4"/>
-        <pc:sldMkLst>
-          <pc:docMk/>
-          <pc:sldMk cId="0" sldId="261"/>
-        </pc:sldMkLst>
-      </pc:sldChg>
-      <pc:sldChg chg="del">
-        <pc:chgData name="Hitarth Mehta" userId="S::w0776103@myscc.ca::9bf5ce78-54ad-458f-b6f9-c562b1e9b62f" providerId="AD" clId="Web-{A79DD57E-47A2-4538-A0C2-DAE60C7F0CB9}" dt="2021-06-29T20:34:05.143" v="20"/>
-        <pc:sldMkLst>
-          <pc:docMk/>
-          <pc:sldMk cId="0" sldId="262"/>
-        </pc:sldMkLst>
-      </pc:sldChg>
-      <pc:sldChg chg="modSp">
-        <pc:chgData name="Hitarth Mehta" userId="S::w0776103@myscc.ca::9bf5ce78-54ad-458f-b6f9-c562b1e9b62f" providerId="AD" clId="Web-{A79DD57E-47A2-4538-A0C2-DAE60C7F0CB9}" dt="2021-06-29T20:31:09.033" v="16" actId="20577"/>
-        <pc:sldMkLst>
-          <pc:docMk/>
-          <pc:sldMk cId="0" sldId="263"/>
-        </pc:sldMkLst>
-        <pc:spChg chg="mod">
-          <ac:chgData name="Hitarth Mehta" userId="S::w0776103@myscc.ca::9bf5ce78-54ad-458f-b6f9-c562b1e9b62f" providerId="AD" clId="Web-{A79DD57E-47A2-4538-A0C2-DAE60C7F0CB9}" dt="2021-06-29T20:31:09.033" v="16" actId="20577"/>
-          <ac:spMkLst>
-            <pc:docMk/>
-            <pc:sldMk cId="0" sldId="263"/>
-            <ac:spMk id="15" creationId="{44254633-6444-4E62-B3AF-E3073021276D}"/>
-          </ac:spMkLst>
-        </pc:spChg>
-      </pc:sldChg>
-      <pc:sldChg chg="del">
-        <pc:chgData name="Hitarth Mehta" userId="S::w0776103@myscc.ca::9bf5ce78-54ad-458f-b6f9-c562b1e9b62f" providerId="AD" clId="Web-{A79DD57E-47A2-4538-A0C2-DAE60C7F0CB9}" dt="2021-06-29T20:34:07.533" v="22"/>
-        <pc:sldMkLst>
-          <pc:docMk/>
-          <pc:sldMk cId="0" sldId="264"/>
-        </pc:sldMkLst>
-      </pc:sldChg>
-      <pc:sldChg chg="del">
-        <pc:chgData name="Hitarth Mehta" userId="S::w0776103@myscc.ca::9bf5ce78-54ad-458f-b6f9-c562b1e9b62f" providerId="AD" clId="Web-{A79DD57E-47A2-4538-A0C2-DAE60C7F0CB9}" dt="2021-06-29T20:34:10.908" v="26"/>
-        <pc:sldMkLst>
-          <pc:docMk/>
-          <pc:sldMk cId="0" sldId="265"/>
-        </pc:sldMkLst>
-      </pc:sldChg>
-      <pc:sldChg chg="del">
-        <pc:chgData name="Hitarth Mehta" userId="S::w0776103@myscc.ca::9bf5ce78-54ad-458f-b6f9-c562b1e9b62f" providerId="AD" clId="Web-{A79DD57E-47A2-4538-A0C2-DAE60C7F0CB9}" dt="2021-06-29T20:34:14.971" v="27"/>
-        <pc:sldMkLst>
-          <pc:docMk/>
-          <pc:sldMk cId="0" sldId="266"/>
-        </pc:sldMkLst>
-      </pc:sldChg>
-      <pc:sldChg chg="del">
-        <pc:chgData name="Hitarth Mehta" userId="S::w0776103@myscc.ca::9bf5ce78-54ad-458f-b6f9-c562b1e9b62f" providerId="AD" clId="Web-{A79DD57E-47A2-4538-A0C2-DAE60C7F0CB9}" dt="2021-06-29T20:34:14.987" v="28"/>
-        <pc:sldMkLst>
-          <pc:docMk/>
-          <pc:sldMk cId="0" sldId="269"/>
-        </pc:sldMkLst>
-      </pc:sldChg>
-      <pc:sldChg chg="del">
-        <pc:chgData name="Hitarth Mehta" userId="S::w0776103@myscc.ca::9bf5ce78-54ad-458f-b6f9-c562b1e9b62f" providerId="AD" clId="Web-{A79DD57E-47A2-4538-A0C2-DAE60C7F0CB9}" dt="2021-06-29T20:34:15.002" v="29"/>
-        <pc:sldMkLst>
-          <pc:docMk/>
-          <pc:sldMk cId="0" sldId="270"/>
-        </pc:sldMkLst>
-      </pc:sldChg>
-      <pc:sldChg chg="del">
-        <pc:chgData name="Hitarth Mehta" userId="S::w0776103@myscc.ca::9bf5ce78-54ad-458f-b6f9-c562b1e9b62f" providerId="AD" clId="Web-{A79DD57E-47A2-4538-A0C2-DAE60C7F0CB9}" dt="2021-06-29T20:34:15.018" v="30"/>
-        <pc:sldMkLst>
-          <pc:docMk/>
-          <pc:sldMk cId="0" sldId="271"/>
-        </pc:sldMkLst>
-      </pc:sldChg>
-      <pc:sldChg chg="del">
-        <pc:chgData name="Hitarth Mehta" userId="S::w0776103@myscc.ca::9bf5ce78-54ad-458f-b6f9-c562b1e9b62f" providerId="AD" clId="Web-{A79DD57E-47A2-4538-A0C2-DAE60C7F0CB9}" dt="2021-06-29T20:34:16.987" v="31"/>
-        <pc:sldMkLst>
-          <pc:docMk/>
-          <pc:sldMk cId="0" sldId="272"/>
-        </pc:sldMkLst>
-      </pc:sldChg>
-      <pc:sldChg chg="del">
-        <pc:chgData name="Hitarth Mehta" userId="S::w0776103@myscc.ca::9bf5ce78-54ad-458f-b6f9-c562b1e9b62f" providerId="AD" clId="Web-{A79DD57E-47A2-4538-A0C2-DAE60C7F0CB9}" dt="2021-06-29T20:34:18.783" v="32"/>
-        <pc:sldMkLst>
-          <pc:docMk/>
-          <pc:sldMk cId="0" sldId="273"/>
-        </pc:sldMkLst>
-      </pc:sldChg>
-      <pc:sldChg chg="add del">
-        <pc:chgData name="Hitarth Mehta" userId="S::w0776103@myscc.ca::9bf5ce78-54ad-458f-b6f9-c562b1e9b62f" providerId="AD" clId="Web-{A79DD57E-47A2-4538-A0C2-DAE60C7F0CB9}" dt="2021-06-29T20:35:11.924" v="42"/>
-        <pc:sldMkLst>
-          <pc:docMk/>
-          <pc:sldMk cId="0" sldId="274"/>
-        </pc:sldMkLst>
-      </pc:sldChg>
-      <pc:sldChg chg="add del">
-        <pc:chgData name="Hitarth Mehta" userId="S::w0776103@myscc.ca::9bf5ce78-54ad-458f-b6f9-c562b1e9b62f" providerId="AD" clId="Web-{A79DD57E-47A2-4538-A0C2-DAE60C7F0CB9}" dt="2021-06-29T20:35:09.924" v="41"/>
-        <pc:sldMkLst>
-          <pc:docMk/>
-          <pc:sldMk cId="1096321037" sldId="281"/>
-        </pc:sldMkLst>
-      </pc:sldChg>
-      <pc:sldChg chg="add del">
-        <pc:chgData name="Hitarth Mehta" userId="S::w0776103@myscc.ca::9bf5ce78-54ad-458f-b6f9-c562b1e9b62f" providerId="AD" clId="Web-{A79DD57E-47A2-4538-A0C2-DAE60C7F0CB9}" dt="2021-06-29T20:28:15.002" v="5"/>
-        <pc:sldMkLst>
-          <pc:docMk/>
-          <pc:sldMk cId="0" sldId="283"/>
-        </pc:sldMkLst>
-      </pc:sldChg>
-      <pc:sldChg chg="del">
-        <pc:chgData name="Hitarth Mehta" userId="S::w0776103@myscc.ca::9bf5ce78-54ad-458f-b6f9-c562b1e9b62f" providerId="AD" clId="Web-{A79DD57E-47A2-4538-A0C2-DAE60C7F0CB9}" dt="2021-06-29T20:34:09.002" v="24"/>
-        <pc:sldMkLst>
-          <pc:docMk/>
-          <pc:sldMk cId="3777338179" sldId="285"/>
-        </pc:sldMkLst>
-      </pc:sldChg>
-      <pc:sldChg chg="del">
-        <pc:chgData name="Hitarth Mehta" userId="S::w0776103@myscc.ca::9bf5ce78-54ad-458f-b6f9-c562b1e9b62f" providerId="AD" clId="Web-{A79DD57E-47A2-4538-A0C2-DAE60C7F0CB9}" dt="2021-06-29T20:34:08.252" v="23"/>
-        <pc:sldMkLst>
-          <pc:docMk/>
-          <pc:sldMk cId="3189176255" sldId="286"/>
-        </pc:sldMkLst>
-      </pc:sldChg>
-      <pc:sldChg chg="del">
-        <pc:chgData name="Hitarth Mehta" userId="S::w0776103@myscc.ca::9bf5ce78-54ad-458f-b6f9-c562b1e9b62f" providerId="AD" clId="Web-{A79DD57E-47A2-4538-A0C2-DAE60C7F0CB9}" dt="2021-06-29T20:34:09.908" v="25"/>
-        <pc:sldMkLst>
-          <pc:docMk/>
-          <pc:sldMk cId="1251469138" sldId="287"/>
-        </pc:sldMkLst>
-      </pc:sldChg>
-      <pc:sldChg chg="del">
-        <pc:chgData name="Hitarth Mehta" userId="S::w0776103@myscc.ca::9bf5ce78-54ad-458f-b6f9-c562b1e9b62f" providerId="AD" clId="Web-{A79DD57E-47A2-4538-A0C2-DAE60C7F0CB9}" dt="2021-06-29T20:34:02.955" v="19"/>
-        <pc:sldMkLst>
-          <pc:docMk/>
-          <pc:sldMk cId="1544778794" sldId="293"/>
-        </pc:sldMkLst>
-      </pc:sldChg>
-      <pc:sldChg chg="del">
-        <pc:chgData name="Hitarth Mehta" userId="S::w0776103@myscc.ca::9bf5ce78-54ad-458f-b6f9-c562b1e9b62f" providerId="AD" clId="Web-{A79DD57E-47A2-4538-A0C2-DAE60C7F0CB9}" dt="2021-06-29T20:34:01.065" v="18"/>
-        <pc:sldMkLst>
-          <pc:docMk/>
-          <pc:sldMk cId="2252150239" sldId="295"/>
-        </pc:sldMkLst>
-      </pc:sldChg>
-      <pc:sldChg chg="modSp">
-        <pc:chgData name="Hitarth Mehta" userId="S::w0776103@myscc.ca::9bf5ce78-54ad-458f-b6f9-c562b1e9b62f" providerId="AD" clId="Web-{A79DD57E-47A2-4538-A0C2-DAE60C7F0CB9}" dt="2021-06-29T20:31:55.112" v="17" actId="14100"/>
-        <pc:sldMkLst>
-          <pc:docMk/>
-          <pc:sldMk cId="1344359263" sldId="304"/>
-        </pc:sldMkLst>
-        <pc:spChg chg="mod">
-          <ac:chgData name="Hitarth Mehta" userId="S::w0776103@myscc.ca::9bf5ce78-54ad-458f-b6f9-c562b1e9b62f" providerId="AD" clId="Web-{A79DD57E-47A2-4538-A0C2-DAE60C7F0CB9}" dt="2021-06-29T20:31:55.112" v="17" actId="14100"/>
-          <ac:spMkLst>
-            <pc:docMk/>
-            <pc:sldMk cId="1344359263" sldId="304"/>
-            <ac:spMk id="3" creationId="{00000000-0000-0000-0000-000000000000}"/>
-          </ac:spMkLst>
-        </pc:spChg>
-      </pc:sldChg>
-      <pc:sldChg chg="addSp delSp modSp">
-        <pc:chgData name="Hitarth Mehta" userId="S::w0776103@myscc.ca::9bf5ce78-54ad-458f-b6f9-c562b1e9b62f" providerId="AD" clId="Web-{A79DD57E-47A2-4538-A0C2-DAE60C7F0CB9}" dt="2021-06-29T20:34:34.768" v="37"/>
-        <pc:sldMkLst>
-          <pc:docMk/>
-          <pc:sldMk cId="1540349514" sldId="315"/>
-        </pc:sldMkLst>
-        <pc:picChg chg="add del mod">
-          <ac:chgData name="Hitarth Mehta" userId="S::w0776103@myscc.ca::9bf5ce78-54ad-458f-b6f9-c562b1e9b62f" providerId="AD" clId="Web-{A79DD57E-47A2-4538-A0C2-DAE60C7F0CB9}" dt="2021-06-29T20:34:34.768" v="37"/>
-          <ac:picMkLst>
-            <pc:docMk/>
-            <pc:sldMk cId="1540349514" sldId="315"/>
-            <ac:picMk id="2" creationId="{C21004E6-2251-4687-9C24-4A015C9ABB4E}"/>
-          </ac:picMkLst>
-        </pc:picChg>
-      </pc:sldChg>
-      <pc:sldChg chg="addSp delSp modSp add del">
-        <pc:chgData name="Hitarth Mehta" userId="S::w0776103@myscc.ca::9bf5ce78-54ad-458f-b6f9-c562b1e9b62f" providerId="AD" clId="Web-{A79DD57E-47A2-4538-A0C2-DAE60C7F0CB9}" dt="2021-06-29T20:35:46.237" v="45"/>
-        <pc:sldMkLst>
-          <pc:docMk/>
-          <pc:sldMk cId="1654595660" sldId="318"/>
-        </pc:sldMkLst>
-        <pc:picChg chg="add del mod">
-          <ac:chgData name="Hitarth Mehta" userId="S::w0776103@myscc.ca::9bf5ce78-54ad-458f-b6f9-c562b1e9b62f" providerId="AD" clId="Web-{A79DD57E-47A2-4538-A0C2-DAE60C7F0CB9}" dt="2021-06-29T20:35:46.237" v="45"/>
-          <ac:picMkLst>
-            <pc:docMk/>
-            <pc:sldMk cId="1654595660" sldId="318"/>
-            <ac:picMk id="2" creationId="{2D44BBDF-D833-4D28-A673-5EA1E09FD096}"/>
-          </ac:picMkLst>
-        </pc:picChg>
-      </pc:sldChg>
-    </pc:docChg>
-  </pc:docChgLst>
-</pc:chgInfo>
-</file>
-
 <file path=ppt/handoutMasters/handoutMaster1.xml><?xml version="1.0" encoding="utf-8"?>
 <p:handoutMaster xmlns:a="http://schemas.openxmlformats.org/drawingml/2006/main" xmlns:r="http://schemas.openxmlformats.org/officeDocument/2006/relationships" xmlns:p="http://schemas.openxmlformats.org/presentationml/2006/main">
   <p:cSld>
@@ -471,7 +264,7 @@
           <a:p>
             <a:fld id="{FF170B3F-1D29-4B52-8EAD-0968FAEA99EE}" type="datetimeFigureOut">
               <a:rPr lang="en-US" smtClean="0"/>
-              <a:t>6/30/2021</a:t>
+              <a:t>30-Jun-21</a:t>
             </a:fld>
             <a:endParaRPr lang="en-US"/>
           </a:p>
@@ -652,7 +445,7 @@
           <a:p>
             <a:fld id="{0190B7FB-74EA-48BD-9D89-9425F8D20A72}" type="datetimeFigureOut">
               <a:rPr lang="en-US" smtClean="0"/>
-              <a:t>6/30/2021</a:t>
+              <a:t>30-Jun-21</a:t>
             </a:fld>
             <a:endParaRPr lang="en-US"/>
           </a:p>
@@ -1088,7 +881,7 @@
             </a:pPr>
             <a:fld id="{31CA9F45-36D0-4B0F-869E-68D6DF5A796F}" type="datetime1">
               <a:rPr lang="en-US" spc="20" smtClean="0"/>
-              <a:t>6/30/2021</a:t>
+              <a:t>30-Jun-21</a:t>
             </a:fld>
             <a:endParaRPr spc="20" dirty="0"/>
           </a:p>
@@ -1211,7 +1004,7 @@
           <a:p>
             <a:fld id="{5E26990F-3DF1-41AF-B249-561408FE5978}" type="datetime1">
               <a:rPr lang="en-US" smtClean="0"/>
-              <a:t>6/30/2021</a:t>
+              <a:t>30-Jun-21</a:t>
             </a:fld>
             <a:endParaRPr lang="en-US"/>
           </a:p>
@@ -1407,7 +1200,7 @@
             </a:pPr>
             <a:fld id="{8CF2F94B-295E-4506-B5CE-5E187B28C814}" type="datetime1">
               <a:rPr lang="en-US" spc="20" smtClean="0"/>
-              <a:t>6/30/2021</a:t>
+              <a:t>30-Jun-21</a:t>
             </a:fld>
             <a:endParaRPr spc="20" dirty="0"/>
           </a:p>
@@ -1649,7 +1442,7 @@
             </a:pPr>
             <a:fld id="{3DE34894-B069-45A9-96B7-4FCF600527F9}" type="datetime1">
               <a:rPr lang="en-US" spc="20" smtClean="0"/>
-              <a:t>6/30/2021</a:t>
+              <a:t>30-Jun-21</a:t>
             </a:fld>
             <a:endParaRPr spc="20" dirty="0"/>
           </a:p>
@@ -1817,7 +1610,7 @@
             </a:pPr>
             <a:fld id="{C056954A-BE3E-4059-B5EF-F489AA7E7EAB}" type="datetime1">
               <a:rPr lang="en-US" spc="20" smtClean="0"/>
-              <a:t>6/30/2021</a:t>
+              <a:t>30-Jun-21</a:t>
             </a:fld>
             <a:endParaRPr spc="20" dirty="0"/>
           </a:p>
@@ -1964,7 +1757,7 @@
             </a:pPr>
             <a:fld id="{3829FA6C-2592-44A0-9813-47698988A547}" type="datetime1">
               <a:rPr lang="en-US" spc="20" smtClean="0"/>
-              <a:t>6/30/2021</a:t>
+              <a:t>30-Jun-21</a:t>
             </a:fld>
             <a:endParaRPr spc="20" dirty="0"/>
           </a:p>
@@ -2163,7 +1956,7 @@
           <a:p>
             <a:fld id="{EEDA2128-9EC6-40A9-AD5F-BC61A8546E26}" type="datetime1">
               <a:rPr lang="en-US" smtClean="0"/>
-              <a:t>6/30/2021</a:t>
+              <a:t>30-Jun-21</a:t>
             </a:fld>
             <a:endParaRPr lang="en-US"/>
           </a:p>
@@ -2349,7 +2142,7 @@
           <a:p>
             <a:fld id="{9D24E0BC-9DF0-47C5-B8FB-BC64FECA87FD}" type="datetime1">
               <a:rPr lang="en-US" smtClean="0"/>
-              <a:t>6/30/2021</a:t>
+              <a:t>30-Jun-21</a:t>
             </a:fld>
             <a:endParaRPr lang="en-US"/>
           </a:p>
@@ -2572,7 +2365,7 @@
           <a:p>
             <a:fld id="{DCE97D31-E7E0-45AE-9231-BC03548AB28D}" type="datetime1">
               <a:rPr lang="en-US" smtClean="0"/>
-              <a:t>6/30/2021</a:t>
+              <a:t>30-Jun-21</a:t>
             </a:fld>
             <a:endParaRPr lang="en-US"/>
           </a:p>
@@ -2729,7 +2522,7 @@
           <a:p>
             <a:fld id="{63E7A9D9-74EA-46B8-86C0-15875B5D02D7}" type="datetime1">
               <a:rPr lang="en-US" smtClean="0"/>
-              <a:t>6/30/2021</a:t>
+              <a:t>30-Jun-21</a:t>
             </a:fld>
             <a:endParaRPr lang="en-US"/>
           </a:p>
@@ -3023,7 +2816,7 @@
             </a:pPr>
             <a:fld id="{48E0A51B-56E7-4877-B369-DE175C49FB62}" type="datetime1">
               <a:rPr lang="en-US" spc="20" smtClean="0"/>
-              <a:t>6/30/2021</a:t>
+              <a:t>30-Jun-21</a:t>
             </a:fld>
             <a:endParaRPr spc="20" dirty="0"/>
           </a:p>
@@ -3409,7 +3202,7 @@
           <a:p>
             <a:fld id="{10BF9995-B1C0-4C69-AFD1-61C25946A02C}" type="datetime1">
               <a:rPr lang="en-US" smtClean="0"/>
-              <a:t>6/30/2021</a:t>
+              <a:t>30-Jun-21</a:t>
             </a:fld>
             <a:endParaRPr lang="en-US"/>
           </a:p>
@@ -5166,8 +4959,8 @@
         </p:nvSpPr>
         <p:spPr>
           <a:xfrm>
-            <a:off x="1038444" y="3110410"/>
-            <a:ext cx="6800631" cy="6669390"/>
+            <a:off x="438606" y="2750892"/>
+            <a:ext cx="7848144" cy="5684505"/>
           </a:xfrm>
           <a:prstGeom prst="rect">
             <a:avLst/>
@@ -5180,9 +4973,6 @@
           <a:lstStyle/>
           <a:p>
             <a:pPr marL="298450" marR="96520" indent="-285750">
-              <a:lnSpc>
-                <a:spcPct val="116399"/>
-              </a:lnSpc>
               <a:spcBef>
                 <a:spcPts val="100"/>
               </a:spcBef>
@@ -5190,86 +4980,12 @@
               <a:buChar char="•"/>
             </a:pPr>
             <a:r>
-              <a:rPr lang="en-US" sz="1600" b="1" dirty="0">
+              <a:rPr lang="en-US" sz="1600" dirty="0">
                 <a:latin typeface="Tahoma" panose="020B0604030504040204" pitchFamily="34" charset="0"/>
                 <a:ea typeface="Tahoma" panose="020B0604030504040204" pitchFamily="34" charset="0"/>
                 <a:cs typeface="Tahoma" panose="020B0604030504040204" pitchFamily="34" charset="0"/>
               </a:rPr>
               <a:t>MILLIONS ROAD TRAFFIC DEATHS EVERY YEAR</a:t>
-            </a:r>
-          </a:p>
-          <a:p>
-            <a:pPr marL="285750" indent="-285750">
-              <a:lnSpc>
-                <a:spcPct val="100000"/>
-              </a:lnSpc>
-              <a:spcBef>
-                <a:spcPts val="30"/>
-              </a:spcBef>
-              <a:buFont typeface="Arial" panose="020B0604020202020204" pitchFamily="34" charset="0"/>
-              <a:buChar char="•"/>
-            </a:pPr>
-            <a:endParaRPr lang="en-US" sz="1600" b="1" dirty="0">
-              <a:latin typeface="Tahoma" panose="020B0604030504040204" pitchFamily="34" charset="0"/>
-              <a:ea typeface="Tahoma" panose="020B0604030504040204" pitchFamily="34" charset="0"/>
-              <a:cs typeface="Tahoma" panose="020B0604030504040204" pitchFamily="34" charset="0"/>
-            </a:endParaRPr>
-          </a:p>
-          <a:p>
-            <a:pPr marL="285750" indent="-285750">
-              <a:lnSpc>
-                <a:spcPct val="100000"/>
-              </a:lnSpc>
-              <a:spcBef>
-                <a:spcPts val="30"/>
-              </a:spcBef>
-              <a:buFont typeface="Arial" panose="020B0604020202020204" pitchFamily="34" charset="0"/>
-              <a:buChar char="•"/>
-            </a:pPr>
-            <a:r>
-              <a:rPr lang="en-US" sz="1600" b="1" dirty="0">
-                <a:latin typeface="Tahoma" panose="020B0604030504040204" pitchFamily="34" charset="0"/>
-                <a:ea typeface="Tahoma" panose="020B0604030504040204" pitchFamily="34" charset="0"/>
-                <a:cs typeface="Tahoma" panose="020B0604030504040204" pitchFamily="34" charset="0"/>
-              </a:rPr>
-              <a:t>CAUSE OF DEATH AMONG CHILDREN AGED 5-14 AND AMONG YOUNG ADULTS AGED 15-29</a:t>
-            </a:r>
-          </a:p>
-          <a:p>
-            <a:pPr marL="285750" indent="-285750">
-              <a:lnSpc>
-                <a:spcPct val="100000"/>
-              </a:lnSpc>
-              <a:spcBef>
-                <a:spcPts val="30"/>
-              </a:spcBef>
-              <a:buFont typeface="Arial" panose="020B0604020202020204" pitchFamily="34" charset="0"/>
-              <a:buChar char="•"/>
-            </a:pPr>
-            <a:endParaRPr lang="en-US" sz="1600" b="1" dirty="0">
-              <a:latin typeface="Tahoma" panose="020B0604030504040204" pitchFamily="34" charset="0"/>
-              <a:ea typeface="Tahoma" panose="020B0604030504040204" pitchFamily="34" charset="0"/>
-              <a:cs typeface="Tahoma" panose="020B0604030504040204" pitchFamily="34" charset="0"/>
-            </a:endParaRPr>
-          </a:p>
-          <a:p>
-            <a:pPr marL="285750" indent="-285750">
-              <a:lnSpc>
-                <a:spcPct val="100000"/>
-              </a:lnSpc>
-              <a:spcBef>
-                <a:spcPts val="30"/>
-              </a:spcBef>
-              <a:buFont typeface="Arial" panose="020B0604020202020204" pitchFamily="34" charset="0"/>
-              <a:buChar char="•"/>
-            </a:pPr>
-            <a:r>
-              <a:rPr lang="en-US" sz="1600" b="1" dirty="0">
-                <a:latin typeface="Tahoma" panose="020B0604030504040204" pitchFamily="34" charset="0"/>
-                <a:ea typeface="Tahoma" panose="020B0604030504040204" pitchFamily="34" charset="0"/>
-                <a:cs typeface="Tahoma" panose="020B0604030504040204" pitchFamily="34" charset="0"/>
-              </a:rPr>
-              <a:t>CAUSES OF DEATHS PEDESTRAINS, CYCLISTS AND MOTORCYCLISTS</a:t>
             </a:r>
           </a:p>
           <a:p>
@@ -5280,7 +4996,7 @@
               <a:buFont typeface="Arial" panose="020B0604020202020204" pitchFamily="34" charset="0"/>
               <a:buChar char="•"/>
             </a:pPr>
-            <a:endParaRPr lang="en-US" sz="1600" b="1" dirty="0">
+            <a:endParaRPr lang="en-US" sz="1600" dirty="0">
               <a:latin typeface="Tahoma" panose="020B0604030504040204" pitchFamily="34" charset="0"/>
               <a:ea typeface="Tahoma" panose="020B0604030504040204" pitchFamily="34" charset="0"/>
               <a:cs typeface="Tahoma" panose="020B0604030504040204" pitchFamily="34" charset="0"/>
@@ -5295,59 +5011,30 @@
               <a:buChar char="•"/>
             </a:pPr>
             <a:r>
-              <a:rPr lang="en-US" sz="1600" b="1" dirty="0">
+              <a:rPr lang="en-US" sz="1600" dirty="0">
                 <a:latin typeface="Tahoma" panose="020B0604030504040204" pitchFamily="34" charset="0"/>
                 <a:ea typeface="Tahoma" panose="020B0604030504040204" pitchFamily="34" charset="0"/>
                 <a:cs typeface="Tahoma" panose="020B0604030504040204" pitchFamily="34" charset="0"/>
               </a:rPr>
-              <a:t>PEDESTRIAN AND BICYCLIST FATALITIES CONTINUE TO RISE IN THE UNITED STATES. ACCORDING TO THE NATIONAL HIGHWAY TRAFFIC SAFETY ADMINISTRATION (NHTSA), MORE PEDESTRIANS AND CYCLISTS WERE KILLED IN 2018 THAN IN ANY YEAR SINCE 1990</a:t>
-            </a:r>
-            <a:br>
-              <a:rPr lang="en-US" sz="1600" b="1" dirty="0">
-                <a:latin typeface="Tahoma" panose="020B0604030504040204" pitchFamily="34" charset="0"/>
-                <a:ea typeface="Tahoma" panose="020B0604030504040204" pitchFamily="34" charset="0"/>
-                <a:cs typeface="Tahoma" panose="020B0604030504040204" pitchFamily="34" charset="0"/>
-              </a:rPr>
-            </a:br>
-            <a:endParaRPr lang="en-US" sz="1600" b="1" dirty="0">
-              <a:latin typeface="Tahoma" panose="020B0604030504040204" pitchFamily="34" charset="0"/>
-              <a:ea typeface="Tahoma" panose="020B0604030504040204" pitchFamily="34" charset="0"/>
-              <a:cs typeface="Tahoma" panose="020B0604030504040204" pitchFamily="34" charset="0"/>
-            </a:endParaRPr>
-          </a:p>
-          <a:p>
-            <a:pPr marL="285750" indent="-285750" algn="l">
-              <a:buFont typeface="Arial" panose="020B0604020202020204" pitchFamily="34" charset="0"/>
-              <a:buChar char="•"/>
-            </a:pPr>
-            <a:r>
-              <a:rPr lang="en-US" sz="1600" b="1" dirty="0">
-                <a:latin typeface="Tahoma" panose="020B0604030504040204" pitchFamily="34" charset="0"/>
-                <a:ea typeface="Tahoma" panose="020B0604030504040204" pitchFamily="34" charset="0"/>
-                <a:cs typeface="Tahoma" panose="020B0604030504040204" pitchFamily="34" charset="0"/>
-              </a:rPr>
-              <a:t>MORE THAN 38,000 PEOPLE DIE EVERY YEAR IN CRASHES ON U.S. ROADWAYS. THE U.S. TRAFFIC FATALITY RATE IS 12.4 DEATHS PER 100,000 INHABITANTS.</a:t>
-            </a:r>
-          </a:p>
-          <a:p>
-            <a:pPr marL="285750" indent="-285750" algn="just">
-              <a:lnSpc>
-                <a:spcPct val="100000"/>
-              </a:lnSpc>
+              <a:t>CAUSE OF DEATH AMONG CHILDREN AGED 5-14 AND AMONG YOUNG ADULTS AGED 15-29</a:t>
+            </a:r>
+          </a:p>
+          <a:p>
+            <a:pPr marL="285750" indent="-285750">
               <a:spcBef>
                 <a:spcPts val="30"/>
               </a:spcBef>
               <a:buFont typeface="Arial" panose="020B0604020202020204" pitchFamily="34" charset="0"/>
               <a:buChar char="•"/>
             </a:pPr>
-            <a:endParaRPr lang="en-US" sz="1600" b="1" dirty="0">
+            <a:endParaRPr lang="en-US" sz="1600" dirty="0">
               <a:latin typeface="Tahoma" panose="020B0604030504040204" pitchFamily="34" charset="0"/>
               <a:ea typeface="Tahoma" panose="020B0604030504040204" pitchFamily="34" charset="0"/>
               <a:cs typeface="Tahoma" panose="020B0604030504040204" pitchFamily="34" charset="0"/>
             </a:endParaRPr>
           </a:p>
           <a:p>
-            <a:pPr marL="285750" indent="-285750" algn="just">
+            <a:pPr marL="285750" indent="-285750">
               <a:spcBef>
                 <a:spcPts val="30"/>
               </a:spcBef>
@@ -5355,30 +5042,30 @@
               <a:buChar char="•"/>
             </a:pPr>
             <a:r>
-              <a:rPr lang="en-US" sz="1600" b="1" dirty="0">
+              <a:rPr lang="en-US" sz="1600" dirty="0">
                 <a:latin typeface="Tahoma" panose="020B0604030504040204" pitchFamily="34" charset="0"/>
                 <a:ea typeface="Tahoma" panose="020B0604030504040204" pitchFamily="34" charset="0"/>
                 <a:cs typeface="Tahoma" panose="020B0604030504040204" pitchFamily="34" charset="0"/>
               </a:rPr>
-              <a:t>ROAD CRASHES ARE THE LEADING CAUSE OF DEATH IN THE U.S. FOR PEOPLE AGED 1-54.</a:t>
-            </a:r>
-          </a:p>
-          <a:p>
-            <a:pPr marL="285750" indent="-285750" algn="just">
+              <a:t>CAUSES OF DEATHS PEDESTRAINS, CYCLISTS AND MOTORCYCLISTS</a:t>
+            </a:r>
+          </a:p>
+          <a:p>
+            <a:pPr marL="285750" indent="-285750">
               <a:spcBef>
                 <a:spcPts val="30"/>
               </a:spcBef>
               <a:buFont typeface="Arial" panose="020B0604020202020204" pitchFamily="34" charset="0"/>
               <a:buChar char="•"/>
             </a:pPr>
-            <a:endParaRPr lang="en-US" sz="1600" b="1" dirty="0">
+            <a:endParaRPr lang="en-US" sz="1600" dirty="0">
               <a:latin typeface="Tahoma" panose="020B0604030504040204" pitchFamily="34" charset="0"/>
               <a:ea typeface="Tahoma" panose="020B0604030504040204" pitchFamily="34" charset="0"/>
               <a:cs typeface="Tahoma" panose="020B0604030504040204" pitchFamily="34" charset="0"/>
             </a:endParaRPr>
           </a:p>
           <a:p>
-            <a:pPr marL="285750" indent="-285750" algn="just">
+            <a:pPr marL="285750" indent="-285750">
               <a:spcBef>
                 <a:spcPts val="30"/>
               </a:spcBef>
@@ -5386,16 +5073,104 @@
               <a:buChar char="•"/>
             </a:pPr>
             <a:r>
-              <a:rPr lang="en-US" sz="1600" b="1" dirty="0">
+              <a:rPr lang="en-US" sz="1600" dirty="0">
                 <a:latin typeface="Tahoma" panose="020B0604030504040204" pitchFamily="34" charset="0"/>
                 <a:ea typeface="Tahoma" panose="020B0604030504040204" pitchFamily="34" charset="0"/>
                 <a:cs typeface="Tahoma" panose="020B0604030504040204" pitchFamily="34" charset="0"/>
               </a:rPr>
+              <a:t>PEDESTRIAN AND BICYCLIST FATALITIES CONTINUE TO RISE IN THE UNITED STATES. ACCORDING TO THE NATIONAL HIGHWAY TRAFFIC SAFETY ADMINISTRATION (NHTSA), MORE PEDESTRIANS AND CYCLISTS WERE KILLED IN 2018 THAN IN ANY YEAR SINCE 1990</a:t>
+            </a:r>
+            <a:br>
+              <a:rPr lang="en-US" sz="1600" dirty="0">
+                <a:latin typeface="Tahoma" panose="020B0604030504040204" pitchFamily="34" charset="0"/>
+                <a:ea typeface="Tahoma" panose="020B0604030504040204" pitchFamily="34" charset="0"/>
+                <a:cs typeface="Tahoma" panose="020B0604030504040204" pitchFamily="34" charset="0"/>
+              </a:rPr>
+            </a:br>
+            <a:endParaRPr lang="en-US" sz="1600" dirty="0">
+              <a:latin typeface="Tahoma" panose="020B0604030504040204" pitchFamily="34" charset="0"/>
+              <a:ea typeface="Tahoma" panose="020B0604030504040204" pitchFamily="34" charset="0"/>
+              <a:cs typeface="Tahoma" panose="020B0604030504040204" pitchFamily="34" charset="0"/>
+            </a:endParaRPr>
+          </a:p>
+          <a:p>
+            <a:pPr marL="285750" indent="-285750">
+              <a:buFont typeface="Arial" panose="020B0604020202020204" pitchFamily="34" charset="0"/>
+              <a:buChar char="•"/>
+            </a:pPr>
+            <a:r>
+              <a:rPr lang="en-US" sz="1600" dirty="0">
+                <a:latin typeface="Tahoma" panose="020B0604030504040204" pitchFamily="34" charset="0"/>
+                <a:ea typeface="Tahoma" panose="020B0604030504040204" pitchFamily="34" charset="0"/>
+                <a:cs typeface="Tahoma" panose="020B0604030504040204" pitchFamily="34" charset="0"/>
+              </a:rPr>
+              <a:t>MORE THAN 38,000 PEOPLE DIE EVERY YEAR IN CRASHES ON U.S. ROADWAYS. THE U.S. TRAFFIC FATALITY RATE IS 12.4 DEATHS PER 100,000 INHABITANTS.</a:t>
+            </a:r>
+          </a:p>
+          <a:p>
+            <a:pPr marL="285750" indent="-285750">
+              <a:spcBef>
+                <a:spcPts val="30"/>
+              </a:spcBef>
+              <a:buFont typeface="Arial" panose="020B0604020202020204" pitchFamily="34" charset="0"/>
+              <a:buChar char="•"/>
+            </a:pPr>
+            <a:endParaRPr lang="en-US" sz="1600" dirty="0">
+              <a:latin typeface="Tahoma" panose="020B0604030504040204" pitchFamily="34" charset="0"/>
+              <a:ea typeface="Tahoma" panose="020B0604030504040204" pitchFamily="34" charset="0"/>
+              <a:cs typeface="Tahoma" panose="020B0604030504040204" pitchFamily="34" charset="0"/>
+            </a:endParaRPr>
+          </a:p>
+          <a:p>
+            <a:pPr marL="285750" indent="-285750">
+              <a:spcBef>
+                <a:spcPts val="30"/>
+              </a:spcBef>
+              <a:buFont typeface="Arial" panose="020B0604020202020204" pitchFamily="34" charset="0"/>
+              <a:buChar char="•"/>
+            </a:pPr>
+            <a:r>
+              <a:rPr lang="en-US" sz="1600" dirty="0">
+                <a:latin typeface="Tahoma" panose="020B0604030504040204" pitchFamily="34" charset="0"/>
+                <a:ea typeface="Tahoma" panose="020B0604030504040204" pitchFamily="34" charset="0"/>
+                <a:cs typeface="Tahoma" panose="020B0604030504040204" pitchFamily="34" charset="0"/>
+              </a:rPr>
+              <a:t>ROAD CRASHES ARE THE LEADING CAUSE OF DEATH IN THE U.S. FOR PEOPLE AGED 1-54.</a:t>
+            </a:r>
+          </a:p>
+          <a:p>
+            <a:pPr marL="285750" indent="-285750">
+              <a:spcBef>
+                <a:spcPts val="30"/>
+              </a:spcBef>
+              <a:buFont typeface="Arial" panose="020B0604020202020204" pitchFamily="34" charset="0"/>
+              <a:buChar char="•"/>
+            </a:pPr>
+            <a:endParaRPr lang="en-US" sz="1600" dirty="0">
+              <a:latin typeface="Tahoma" panose="020B0604030504040204" pitchFamily="34" charset="0"/>
+              <a:ea typeface="Tahoma" panose="020B0604030504040204" pitchFamily="34" charset="0"/>
+              <a:cs typeface="Tahoma" panose="020B0604030504040204" pitchFamily="34" charset="0"/>
+            </a:endParaRPr>
+          </a:p>
+          <a:p>
+            <a:pPr marL="285750" indent="-285750">
+              <a:spcBef>
+                <a:spcPts val="30"/>
+              </a:spcBef>
+              <a:buFont typeface="Arial" panose="020B0604020202020204" pitchFamily="34" charset="0"/>
+              <a:buChar char="•"/>
+            </a:pPr>
+            <a:r>
+              <a:rPr lang="en-US" sz="1600" dirty="0">
+                <a:latin typeface="Tahoma" panose="020B0604030504040204" pitchFamily="34" charset="0"/>
+                <a:ea typeface="Tahoma" panose="020B0604030504040204" pitchFamily="34" charset="0"/>
+                <a:cs typeface="Tahoma" panose="020B0604030504040204" pitchFamily="34" charset="0"/>
+              </a:rPr>
               <a:t>THE U.S. SUFFERS THE MOST ROAD CRASH DEATHS OF ANY HIGH-INCOME COUNTRY, ABOUT 50% HIGHER THAN SIMILAR COUNTRIES IN WESTERN EUROPE, CANADA, AUSTRALIA AND JAPAN.</a:t>
             </a:r>
           </a:p>
           <a:p>
-            <a:pPr marL="285750" indent="-285750" algn="just">
+            <a:pPr marL="285750" indent="-285750">
               <a:spcBef>
                 <a:spcPts val="30"/>
               </a:spcBef>
@@ -5409,10 +5184,7 @@
             </a:endParaRPr>
           </a:p>
           <a:p>
-            <a:pPr marL="285750" indent="-285750" algn="just">
-              <a:lnSpc>
-                <a:spcPct val="100000"/>
-              </a:lnSpc>
+            <a:pPr marL="285750" indent="-285750">
               <a:spcBef>
                 <a:spcPts val="30"/>
               </a:spcBef>
@@ -5698,8 +5470,8 @@
         </p:nvSpPr>
         <p:spPr>
           <a:xfrm>
-            <a:off x="1038444" y="2033700"/>
-            <a:ext cx="6404887" cy="874598"/>
+            <a:off x="723903" y="2033700"/>
+            <a:ext cx="7191371" cy="443711"/>
           </a:xfrm>
           <a:prstGeom prst="rect">
             <a:avLst/>
@@ -6088,7 +5860,7 @@
         </p:nvSpPr>
         <p:spPr>
           <a:xfrm>
-            <a:off x="8465151" y="1717437"/>
+            <a:off x="8753475" y="1717437"/>
             <a:ext cx="9525" cy="6096000"/>
           </a:xfrm>
           <a:custGeom>
@@ -6127,6 +5899,322 @@
           <a:lstStyle/>
           <a:p>
             <a:endParaRPr/>
+          </a:p>
+        </p:txBody>
+      </p:sp>
+      <p:sp>
+        <p:nvSpPr>
+          <p:cNvPr id="13" name="object 6">
+            <a:extLst>
+              <a:ext uri="{FF2B5EF4-FFF2-40B4-BE49-F238E27FC236}">
+                <a16:creationId xmlns:a16="http://schemas.microsoft.com/office/drawing/2014/main" id="{029A85E5-93E6-4F14-B9B7-B930E75EB512}"/>
+              </a:ext>
+            </a:extLst>
+          </p:cNvPr>
+          <p:cNvSpPr txBox="1"/>
+          <p:nvPr/>
+        </p:nvSpPr>
+        <p:spPr>
+          <a:xfrm>
+            <a:off x="1149541" y="9420058"/>
+            <a:ext cx="3403600" cy="257122"/>
+          </a:xfrm>
+          <a:prstGeom prst="rect">
+            <a:avLst/>
+          </a:prstGeom>
+        </p:spPr>
+        <p:txBody>
+          <a:bodyPr vert="horz" wrap="square" lIns="0" tIns="10795" rIns="0" bIns="0" rtlCol="0">
+            <a:spAutoFit/>
+          </a:bodyPr>
+          <a:lstStyle/>
+          <a:p>
+            <a:pPr marL="12700">
+              <a:lnSpc>
+                <a:spcPct val="100000"/>
+              </a:lnSpc>
+              <a:spcBef>
+                <a:spcPts val="85"/>
+              </a:spcBef>
+            </a:pPr>
+            <a:r>
+              <a:rPr lang="en-US" sz="1600" b="1" kern="1200" dirty="0">
+                <a:ea typeface="+mn-ea"/>
+              </a:rPr>
+              <a:t>A Countrywide Traffic Accident Dataset</a:t>
+            </a:r>
+            <a:endParaRPr sz="1600" b="1" dirty="0">
+              <a:latin typeface="Lucida Sans Unicode"/>
+              <a:cs typeface="Lucida Sans Unicode"/>
+            </a:endParaRPr>
+          </a:p>
+        </p:txBody>
+      </p:sp>
+      <p:sp>
+        <p:nvSpPr>
+          <p:cNvPr id="14" name="object 7">
+            <a:extLst>
+              <a:ext uri="{FF2B5EF4-FFF2-40B4-BE49-F238E27FC236}">
+                <a16:creationId xmlns:a16="http://schemas.microsoft.com/office/drawing/2014/main" id="{CD29086B-FBD6-4EB6-AB3B-851986AFB1F4}"/>
+              </a:ext>
+            </a:extLst>
+          </p:cNvPr>
+          <p:cNvSpPr txBox="1">
+            <a:spLocks/>
+          </p:cNvSpPr>
+          <p:nvPr/>
+        </p:nvSpPr>
+        <p:spPr>
+          <a:xfrm>
+            <a:off x="6650562" y="9420058"/>
+            <a:ext cx="6019800" cy="257122"/>
+          </a:xfrm>
+          <a:prstGeom prst="rect">
+            <a:avLst/>
+          </a:prstGeom>
+        </p:spPr>
+        <p:txBody>
+          <a:bodyPr vert="horz" wrap="square" lIns="0" tIns="10795" rIns="0" bIns="0" rtlCol="0">
+            <a:spAutoFit/>
+          </a:bodyPr>
+          <a:lstStyle>
+            <a:defPPr>
+              <a:defRPr lang="en-US"/>
+            </a:defPPr>
+            <a:lvl1pPr marL="0" algn="l" defTabSz="914400" rtl="0" eaLnBrk="1" latinLnBrk="0" hangingPunct="1">
+              <a:defRPr sz="1400" b="0" i="0" kern="1200">
+                <a:solidFill>
+                  <a:schemeClr val="tx1"/>
+                </a:solidFill>
+                <a:latin typeface="Lucida Sans Unicode"/>
+                <a:ea typeface="+mn-ea"/>
+                <a:cs typeface="Lucida Sans Unicode"/>
+              </a:defRPr>
+            </a:lvl1pPr>
+            <a:lvl2pPr marL="457200" algn="l" defTabSz="914400" rtl="0" eaLnBrk="1" latinLnBrk="0" hangingPunct="1">
+              <a:defRPr sz="1800" kern="1200">
+                <a:solidFill>
+                  <a:schemeClr val="tx1"/>
+                </a:solidFill>
+                <a:latin typeface="+mn-lt"/>
+                <a:ea typeface="+mn-ea"/>
+                <a:cs typeface="+mn-cs"/>
+              </a:defRPr>
+            </a:lvl2pPr>
+            <a:lvl3pPr marL="914400" algn="l" defTabSz="914400" rtl="0" eaLnBrk="1" latinLnBrk="0" hangingPunct="1">
+              <a:defRPr sz="1800" kern="1200">
+                <a:solidFill>
+                  <a:schemeClr val="tx1"/>
+                </a:solidFill>
+                <a:latin typeface="+mn-lt"/>
+                <a:ea typeface="+mn-ea"/>
+                <a:cs typeface="+mn-cs"/>
+              </a:defRPr>
+            </a:lvl3pPr>
+            <a:lvl4pPr marL="1371600" algn="l" defTabSz="914400" rtl="0" eaLnBrk="1" latinLnBrk="0" hangingPunct="1">
+              <a:defRPr sz="1800" kern="1200">
+                <a:solidFill>
+                  <a:schemeClr val="tx1"/>
+                </a:solidFill>
+                <a:latin typeface="+mn-lt"/>
+                <a:ea typeface="+mn-ea"/>
+                <a:cs typeface="+mn-cs"/>
+              </a:defRPr>
+            </a:lvl4pPr>
+            <a:lvl5pPr marL="1828800" algn="l" defTabSz="914400" rtl="0" eaLnBrk="1" latinLnBrk="0" hangingPunct="1">
+              <a:defRPr sz="1800" kern="1200">
+                <a:solidFill>
+                  <a:schemeClr val="tx1"/>
+                </a:solidFill>
+                <a:latin typeface="+mn-lt"/>
+                <a:ea typeface="+mn-ea"/>
+                <a:cs typeface="+mn-cs"/>
+              </a:defRPr>
+            </a:lvl5pPr>
+            <a:lvl6pPr marL="2286000" algn="l" defTabSz="914400" rtl="0" eaLnBrk="1" latinLnBrk="0" hangingPunct="1">
+              <a:defRPr sz="1800" kern="1200">
+                <a:solidFill>
+                  <a:schemeClr val="tx1"/>
+                </a:solidFill>
+                <a:latin typeface="+mn-lt"/>
+                <a:ea typeface="+mn-ea"/>
+                <a:cs typeface="+mn-cs"/>
+              </a:defRPr>
+            </a:lvl6pPr>
+            <a:lvl7pPr marL="2743200" algn="l" defTabSz="914400" rtl="0" eaLnBrk="1" latinLnBrk="0" hangingPunct="1">
+              <a:defRPr sz="1800" kern="1200">
+                <a:solidFill>
+                  <a:schemeClr val="tx1"/>
+                </a:solidFill>
+                <a:latin typeface="+mn-lt"/>
+                <a:ea typeface="+mn-ea"/>
+                <a:cs typeface="+mn-cs"/>
+              </a:defRPr>
+            </a:lvl7pPr>
+            <a:lvl8pPr marL="3200400" algn="l" defTabSz="914400" rtl="0" eaLnBrk="1" latinLnBrk="0" hangingPunct="1">
+              <a:defRPr sz="1800" kern="1200">
+                <a:solidFill>
+                  <a:schemeClr val="tx1"/>
+                </a:solidFill>
+                <a:latin typeface="+mn-lt"/>
+                <a:ea typeface="+mn-ea"/>
+                <a:cs typeface="+mn-cs"/>
+              </a:defRPr>
+            </a:lvl8pPr>
+            <a:lvl9pPr marL="3657600" algn="l" defTabSz="914400" rtl="0" eaLnBrk="1" latinLnBrk="0" hangingPunct="1">
+              <a:defRPr sz="1800" kern="1200">
+                <a:solidFill>
+                  <a:schemeClr val="tx1"/>
+                </a:solidFill>
+                <a:latin typeface="+mn-lt"/>
+                <a:ea typeface="+mn-ea"/>
+                <a:cs typeface="+mn-cs"/>
+              </a:defRPr>
+            </a:lvl9pPr>
+          </a:lstStyle>
+          <a:p>
+            <a:pPr marL="12700">
+              <a:spcBef>
+                <a:spcPts val="85"/>
+              </a:spcBef>
+            </a:pPr>
+            <a:r>
+              <a:rPr lang="en-US" sz="1600" b="1">
+                <a:latin typeface="+mn-lt"/>
+                <a:cs typeface="+mn-cs"/>
+              </a:rPr>
+              <a:t>DAB103-21S-003 (Analytical Tools &amp; Decision Making 21 Spring - 003)</a:t>
+            </a:r>
+            <a:endParaRPr lang="en-US" sz="1600" b="1" dirty="0">
+              <a:latin typeface="+mn-lt"/>
+              <a:cs typeface="+mn-cs"/>
+            </a:endParaRPr>
+          </a:p>
+        </p:txBody>
+      </p:sp>
+      <p:sp>
+        <p:nvSpPr>
+          <p:cNvPr id="15" name="object 8">
+            <a:extLst>
+              <a:ext uri="{FF2B5EF4-FFF2-40B4-BE49-F238E27FC236}">
+                <a16:creationId xmlns:a16="http://schemas.microsoft.com/office/drawing/2014/main" id="{7769284D-0445-4E12-B25A-4E3392F5B3F5}"/>
+              </a:ext>
+            </a:extLst>
+          </p:cNvPr>
+          <p:cNvSpPr txBox="1">
+            <a:spLocks/>
+          </p:cNvSpPr>
+          <p:nvPr/>
+        </p:nvSpPr>
+        <p:spPr>
+          <a:xfrm>
+            <a:off x="15803369" y="9420058"/>
+            <a:ext cx="1807844" cy="257122"/>
+          </a:xfrm>
+          <a:prstGeom prst="rect">
+            <a:avLst/>
+          </a:prstGeom>
+        </p:spPr>
+        <p:txBody>
+          <a:bodyPr vert="horz" wrap="square" lIns="0" tIns="10795" rIns="0" bIns="0" rtlCol="0">
+            <a:spAutoFit/>
+          </a:bodyPr>
+          <a:lstStyle>
+            <a:defPPr>
+              <a:defRPr lang="en-US"/>
+            </a:defPPr>
+            <a:lvl1pPr marL="12700">
+              <a:spcBef>
+                <a:spcPts val="85"/>
+              </a:spcBef>
+              <a:defRPr sz="1600" b="1" i="0"/>
+            </a:lvl1pPr>
+            <a:lvl2pPr marL="457200" algn="l" defTabSz="914400" rtl="0" eaLnBrk="1" latinLnBrk="0" hangingPunct="1">
+              <a:defRPr sz="1800" kern="1200">
+                <a:solidFill>
+                  <a:schemeClr val="tx1"/>
+                </a:solidFill>
+                <a:latin typeface="+mn-lt"/>
+                <a:ea typeface="+mn-ea"/>
+                <a:cs typeface="+mn-cs"/>
+              </a:defRPr>
+            </a:lvl2pPr>
+            <a:lvl3pPr marL="914400" algn="l" defTabSz="914400" rtl="0" eaLnBrk="1" latinLnBrk="0" hangingPunct="1">
+              <a:defRPr sz="1800" kern="1200">
+                <a:solidFill>
+                  <a:schemeClr val="tx1"/>
+                </a:solidFill>
+                <a:latin typeface="+mn-lt"/>
+                <a:ea typeface="+mn-ea"/>
+                <a:cs typeface="+mn-cs"/>
+              </a:defRPr>
+            </a:lvl3pPr>
+            <a:lvl4pPr marL="1371600" algn="l" defTabSz="914400" rtl="0" eaLnBrk="1" latinLnBrk="0" hangingPunct="1">
+              <a:defRPr sz="1800" kern="1200">
+                <a:solidFill>
+                  <a:schemeClr val="tx1"/>
+                </a:solidFill>
+                <a:latin typeface="+mn-lt"/>
+                <a:ea typeface="+mn-ea"/>
+                <a:cs typeface="+mn-cs"/>
+              </a:defRPr>
+            </a:lvl4pPr>
+            <a:lvl5pPr marL="1828800" algn="l" defTabSz="914400" rtl="0" eaLnBrk="1" latinLnBrk="0" hangingPunct="1">
+              <a:defRPr sz="1800" kern="1200">
+                <a:solidFill>
+                  <a:schemeClr val="tx1"/>
+                </a:solidFill>
+                <a:latin typeface="+mn-lt"/>
+                <a:ea typeface="+mn-ea"/>
+                <a:cs typeface="+mn-cs"/>
+              </a:defRPr>
+            </a:lvl5pPr>
+            <a:lvl6pPr marL="2286000" algn="l" defTabSz="914400" rtl="0" eaLnBrk="1" latinLnBrk="0" hangingPunct="1">
+              <a:defRPr sz="1800" kern="1200">
+                <a:solidFill>
+                  <a:schemeClr val="tx1"/>
+                </a:solidFill>
+                <a:latin typeface="+mn-lt"/>
+                <a:ea typeface="+mn-ea"/>
+                <a:cs typeface="+mn-cs"/>
+              </a:defRPr>
+            </a:lvl6pPr>
+            <a:lvl7pPr marL="2743200" algn="l" defTabSz="914400" rtl="0" eaLnBrk="1" latinLnBrk="0" hangingPunct="1">
+              <a:defRPr sz="1800" kern="1200">
+                <a:solidFill>
+                  <a:schemeClr val="tx1"/>
+                </a:solidFill>
+                <a:latin typeface="+mn-lt"/>
+                <a:ea typeface="+mn-ea"/>
+                <a:cs typeface="+mn-cs"/>
+              </a:defRPr>
+            </a:lvl7pPr>
+            <a:lvl8pPr marL="3200400" algn="l" defTabSz="914400" rtl="0" eaLnBrk="1" latinLnBrk="0" hangingPunct="1">
+              <a:defRPr sz="1800" kern="1200">
+                <a:solidFill>
+                  <a:schemeClr val="tx1"/>
+                </a:solidFill>
+                <a:latin typeface="+mn-lt"/>
+                <a:ea typeface="+mn-ea"/>
+                <a:cs typeface="+mn-cs"/>
+              </a:defRPr>
+            </a:lvl8pPr>
+            <a:lvl9pPr marL="3657600" algn="l" defTabSz="914400" rtl="0" eaLnBrk="1" latinLnBrk="0" hangingPunct="1">
+              <a:defRPr sz="1800" kern="1200">
+                <a:solidFill>
+                  <a:schemeClr val="tx1"/>
+                </a:solidFill>
+                <a:latin typeface="+mn-lt"/>
+                <a:ea typeface="+mn-ea"/>
+                <a:cs typeface="+mn-cs"/>
+              </a:defRPr>
+            </a:lvl9pPr>
+          </a:lstStyle>
+          <a:p>
+            <a:r>
+              <a:rPr lang="en-US" dirty="0"/>
+              <a:t>June,29 2021</a:t>
+            </a:r>
           </a:p>
         </p:txBody>
       </p:sp>
@@ -7698,43 +7786,7 @@
                 <a:ea typeface="Tahoma"/>
                 <a:cs typeface="Tahoma"/>
               </a:rPr>
-              <a:t> such as Severity, </a:t>
-            </a:r>
-            <a:r>
-              <a:rPr lang="en-US" sz="3200" b="0" i="0" dirty="0" err="1">
-                <a:effectLst/>
-                <a:latin typeface="Tahoma"/>
-                <a:ea typeface="Tahoma"/>
-                <a:cs typeface="Tahoma"/>
-              </a:rPr>
-              <a:t>lat</a:t>
-            </a:r>
-            <a:r>
-              <a:rPr lang="en-US" sz="3200" b="0" i="0" dirty="0">
-                <a:effectLst/>
-                <a:latin typeface="Tahoma"/>
-                <a:ea typeface="Tahoma"/>
-                <a:cs typeface="Tahoma"/>
-              </a:rPr>
-              <a:t>, </a:t>
-            </a:r>
-            <a:r>
-              <a:rPr lang="en-US" sz="3200" b="0" i="0" dirty="0" err="1">
-                <a:effectLst/>
-                <a:latin typeface="Tahoma"/>
-                <a:ea typeface="Tahoma"/>
-                <a:cs typeface="Tahoma"/>
-              </a:rPr>
-              <a:t>lng</a:t>
-            </a:r>
-            <a:r>
-              <a:rPr lang="en-US" sz="3200" b="0" i="0" dirty="0">
-                <a:effectLst/>
-                <a:latin typeface="Tahoma"/>
-                <a:ea typeface="Tahoma"/>
-                <a:cs typeface="Tahoma"/>
-              </a:rPr>
-              <a:t>, distance, Weather and traffic related columns are of </a:t>
+              <a:t> such as Severity, lat, lng, distance, Weather and traffic related columns are of </a:t>
             </a:r>
             <a:r>
               <a:rPr lang="en-US" sz="3200" b="1" i="0" dirty="0">
@@ -11692,25 +11744,7 @@
                 <a:ea typeface="Tahoma" panose="020B0604030504040204" pitchFamily="34" charset="0"/>
                 <a:cs typeface="Tahoma" panose="020B0604030504040204" pitchFamily="34" charset="0"/>
               </a:rPr>
-              <a:t>Looks like the Temperature ranges between -89 and 203 </a:t>
-            </a:r>
-            <a:r>
-              <a:rPr lang="en-US" sz="2400" b="0" i="0" dirty="0" err="1">
-                <a:effectLst/>
-                <a:latin typeface="Tahoma" panose="020B0604030504040204" pitchFamily="34" charset="0"/>
-                <a:ea typeface="Tahoma" panose="020B0604030504040204" pitchFamily="34" charset="0"/>
-                <a:cs typeface="Tahoma" panose="020B0604030504040204" pitchFamily="34" charset="0"/>
-              </a:rPr>
-              <a:t>fahrenheit</a:t>
-            </a:r>
-            <a:r>
-              <a:rPr lang="en-US" sz="2400" b="0" i="0" dirty="0">
-                <a:effectLst/>
-                <a:latin typeface="Tahoma" panose="020B0604030504040204" pitchFamily="34" charset="0"/>
-                <a:ea typeface="Tahoma" panose="020B0604030504040204" pitchFamily="34" charset="0"/>
-                <a:cs typeface="Tahoma" panose="020B0604030504040204" pitchFamily="34" charset="0"/>
-              </a:rPr>
-              <a:t> in the data.</a:t>
+              <a:t>Looks like the Temperature ranges between -89 and 203 Fahrenheit in the data.</a:t>
             </a:r>
           </a:p>
           <a:p>
@@ -11746,25 +11780,7 @@
                 <a:ea typeface="Tahoma" panose="020B0604030504040204" pitchFamily="34" charset="0"/>
                 <a:cs typeface="Tahoma" panose="020B0604030504040204" pitchFamily="34" charset="0"/>
               </a:rPr>
-              <a:t>Fact : There are multiple </a:t>
-            </a:r>
-            <a:r>
-              <a:rPr lang="en-US" sz="2400" b="0" i="0" dirty="0" err="1">
-                <a:effectLst/>
-                <a:latin typeface="Tahoma" panose="020B0604030504040204" pitchFamily="34" charset="0"/>
-                <a:ea typeface="Tahoma" panose="020B0604030504040204" pitchFamily="34" charset="0"/>
-                <a:cs typeface="Tahoma" panose="020B0604030504040204" pitchFamily="34" charset="0"/>
-              </a:rPr>
-              <a:t>TimeZone</a:t>
-            </a:r>
-            <a:r>
-              <a:rPr lang="en-US" sz="2400" b="0" i="0" dirty="0">
-                <a:effectLst/>
-                <a:latin typeface="Tahoma" panose="020B0604030504040204" pitchFamily="34" charset="0"/>
-                <a:ea typeface="Tahoma" panose="020B0604030504040204" pitchFamily="34" charset="0"/>
-                <a:cs typeface="Tahoma" panose="020B0604030504040204" pitchFamily="34" charset="0"/>
-              </a:rPr>
-              <a:t> in US.</a:t>
+              <a:t>Fact : There are multiple Time Zone in US.</a:t>
             </a:r>
           </a:p>
           <a:p>
@@ -14036,20 +14052,13 @@
               </a:spcBef>
             </a:pPr>
             <a:r>
-              <a:rPr lang="en-US" sz="4000" b="1">
+              <a:rPr lang="en-US" sz="4000" b="1" dirty="0">
                 <a:latin typeface="Tahoma"/>
                 <a:cs typeface="Tahoma"/>
               </a:rPr>
-              <a:t>Count of Unique values in </a:t>
-            </a:r>
-            <a:r>
-              <a:rPr lang="en-US" sz="4000" b="1" err="1">
-                <a:latin typeface="Tahoma"/>
-                <a:cs typeface="Tahoma"/>
-              </a:rPr>
-              <a:t>DataSet</a:t>
-            </a:r>
-            <a:endParaRPr sz="4000">
+              <a:t>Count of Unique values in Dataset</a:t>
+            </a:r>
+            <a:endParaRPr sz="4000" dirty="0">
               <a:latin typeface="Tahoma"/>
               <a:cs typeface="Tahoma"/>
             </a:endParaRPr>
@@ -15691,20 +15700,13 @@
               </a:spcBef>
             </a:pPr>
             <a:r>
-              <a:rPr lang="en-US" sz="4000" b="1" err="1">
+              <a:rPr lang="en-US" sz="4000" b="1" dirty="0">
                 <a:latin typeface="Tahoma"/>
                 <a:cs typeface="Tahoma"/>
               </a:rPr>
-              <a:t>Statewise</a:t>
-            </a:r>
-            <a:r>
-              <a:rPr lang="en-US" sz="4000" b="1">
-                <a:latin typeface="Tahoma"/>
-                <a:cs typeface="Tahoma"/>
-              </a:rPr>
-              <a:t> Accidents</a:t>
-            </a:r>
-            <a:endParaRPr sz="4000">
+              <a:t>State wise Accidents</a:t>
+            </a:r>
+            <a:endParaRPr sz="4000" dirty="0">
               <a:latin typeface="Tahoma"/>
               <a:cs typeface="Tahoma"/>
             </a:endParaRPr>
@@ -20440,14 +20442,283 @@
       </p:sp>
       <p:sp>
         <p:nvSpPr>
-          <p:cNvPr id="10" name="object 10"/>
+          <p:cNvPr id="7" name="object 7"/>
           <p:cNvSpPr txBox="1"/>
           <p:nvPr/>
         </p:nvSpPr>
         <p:spPr>
           <a:xfrm>
-            <a:off x="1016000" y="9235371"/>
-            <a:ext cx="2070735" cy="502284"/>
+            <a:off x="858982" y="2629644"/>
+            <a:ext cx="15970759" cy="8815234"/>
+          </a:xfrm>
+          <a:prstGeom prst="rect">
+            <a:avLst/>
+          </a:prstGeom>
+        </p:spPr>
+        <p:txBody>
+          <a:bodyPr vert="horz" wrap="square" lIns="0" tIns="12700" rIns="0" bIns="0" rtlCol="0" anchor="t">
+            <a:spAutoFit/>
+          </a:bodyPr>
+          <a:lstStyle/>
+          <a:p>
+            <a:r>
+              <a:rPr lang="en-US" sz="2200" b="1" dirty="0">
+                <a:latin typeface="Tahoma" panose="020B0604030504040204" pitchFamily="34" charset="0"/>
+                <a:ea typeface="Tahoma" panose="020B0604030504040204" pitchFamily="34" charset="0"/>
+                <a:cs typeface="Tahoma" panose="020B0604030504040204" pitchFamily="34" charset="0"/>
+              </a:rPr>
+              <a:t>1. Does</a:t>
+            </a:r>
+            <a:r>
+              <a:rPr lang="en-US" sz="2200" b="1" i="0" u="none" strike="noStrike" baseline="0" dirty="0">
+                <a:latin typeface="Tahoma" panose="020B0604030504040204" pitchFamily="34" charset="0"/>
+                <a:ea typeface="Tahoma" panose="020B0604030504040204" pitchFamily="34" charset="0"/>
+                <a:cs typeface="Tahoma" panose="020B0604030504040204" pitchFamily="34" charset="0"/>
+              </a:rPr>
+              <a:t> the data include missing, incomplete or invalid records?</a:t>
+            </a:r>
+          </a:p>
+          <a:p>
+            <a:r>
+              <a:rPr lang="en-US" sz="2200" b="1" dirty="0">
+                <a:latin typeface="Tahoma" panose="020B0604030504040204" pitchFamily="34" charset="0"/>
+                <a:ea typeface="Tahoma" panose="020B0604030504040204" pitchFamily="34" charset="0"/>
+                <a:cs typeface="Tahoma" panose="020B0604030504040204" pitchFamily="34" charset="0"/>
+              </a:rPr>
+              <a:t>Answer </a:t>
+            </a:r>
+            <a:r>
+              <a:rPr lang="en-US" sz="2200" dirty="0">
+                <a:latin typeface="Tahoma" panose="020B0604030504040204" pitchFamily="34" charset="0"/>
+                <a:ea typeface="Tahoma" panose="020B0604030504040204" pitchFamily="34" charset="0"/>
+                <a:cs typeface="Tahoma" panose="020B0604030504040204" pitchFamily="34" charset="0"/>
+              </a:rPr>
+              <a:t>: From the initial observation, looks like almost  40% of the data in the dataset is having null or missing values which will be discovered and removed in dataset cleanup part.</a:t>
+            </a:r>
+          </a:p>
+          <a:p>
+            <a:endParaRPr lang="en-US" sz="2200" dirty="0">
+              <a:latin typeface="Tahoma" panose="020B0604030504040204" pitchFamily="34" charset="0"/>
+              <a:ea typeface="Tahoma" panose="020B0604030504040204" pitchFamily="34" charset="0"/>
+              <a:cs typeface="Tahoma" panose="020B0604030504040204" pitchFamily="34" charset="0"/>
+            </a:endParaRPr>
+          </a:p>
+          <a:p>
+            <a:r>
+              <a:rPr lang="en-US" sz="2200" b="1" dirty="0">
+                <a:latin typeface="Tahoma" panose="020B0604030504040204" pitchFamily="34" charset="0"/>
+                <a:ea typeface="Tahoma" panose="020B0604030504040204" pitchFamily="34" charset="0"/>
+                <a:cs typeface="Tahoma" panose="020B0604030504040204" pitchFamily="34" charset="0"/>
+              </a:rPr>
+              <a:t>2. Is the data imbalanced (large number of the records represent a majority class and very few records represent the minority class)?</a:t>
+            </a:r>
+          </a:p>
+          <a:p>
+            <a:r>
+              <a:rPr lang="en-US" sz="2200" b="1" dirty="0">
+                <a:latin typeface="Tahoma" panose="020B0604030504040204" pitchFamily="34" charset="0"/>
+                <a:ea typeface="Tahoma" panose="020B0604030504040204" pitchFamily="34" charset="0"/>
+                <a:cs typeface="Tahoma" panose="020B0604030504040204" pitchFamily="34" charset="0"/>
+              </a:rPr>
+              <a:t>Answer </a:t>
+            </a:r>
+            <a:r>
+              <a:rPr lang="en-US" sz="2200" dirty="0">
+                <a:latin typeface="Tahoma" panose="020B0604030504040204" pitchFamily="34" charset="0"/>
+                <a:ea typeface="Tahoma" panose="020B0604030504040204" pitchFamily="34" charset="0"/>
+                <a:cs typeface="Tahoma" panose="020B0604030504040204" pitchFamily="34" charset="0"/>
+              </a:rPr>
+              <a:t>: Yes , Many columns such as city, states, bump </a:t>
+            </a:r>
+            <a:r>
+              <a:rPr lang="en-US" sz="2200" dirty="0" err="1">
+                <a:latin typeface="Tahoma" panose="020B0604030504040204" pitchFamily="34" charset="0"/>
+                <a:ea typeface="Tahoma" panose="020B0604030504040204" pitchFamily="34" charset="0"/>
+                <a:cs typeface="Tahoma" panose="020B0604030504040204" pitchFamily="34" charset="0"/>
+              </a:rPr>
+              <a:t>etc</a:t>
+            </a:r>
+            <a:r>
+              <a:rPr lang="en-US" sz="2200" dirty="0">
+                <a:latin typeface="Tahoma" panose="020B0604030504040204" pitchFamily="34" charset="0"/>
+                <a:ea typeface="Tahoma" panose="020B0604030504040204" pitchFamily="34" charset="0"/>
+                <a:cs typeface="Tahoma" panose="020B0604030504040204" pitchFamily="34" charset="0"/>
+              </a:rPr>
+              <a:t> are having division in large number of the records represent a majority class and very few records represent the minority class.</a:t>
+            </a:r>
+          </a:p>
+          <a:p>
+            <a:endParaRPr lang="en-US" sz="2200" dirty="0">
+              <a:latin typeface="Tahoma" panose="020B0604030504040204" pitchFamily="34" charset="0"/>
+              <a:ea typeface="Tahoma" panose="020B0604030504040204" pitchFamily="34" charset="0"/>
+              <a:cs typeface="Tahoma" panose="020B0604030504040204" pitchFamily="34" charset="0"/>
+            </a:endParaRPr>
+          </a:p>
+          <a:p>
+            <a:r>
+              <a:rPr lang="en-US" sz="2200" b="1" dirty="0">
+                <a:latin typeface="Tahoma" panose="020B0604030504040204" pitchFamily="34" charset="0"/>
+                <a:ea typeface="Tahoma" panose="020B0604030504040204" pitchFamily="34" charset="0"/>
+                <a:cs typeface="Tahoma" panose="020B0604030504040204" pitchFamily="34" charset="0"/>
+              </a:rPr>
+              <a:t>3. Are some data elements highly correlated with each other?</a:t>
+            </a:r>
+          </a:p>
+          <a:p>
+            <a:r>
+              <a:rPr lang="en-US" sz="2200" b="1" dirty="0">
+                <a:latin typeface="Tahoma" panose="020B0604030504040204" pitchFamily="34" charset="0"/>
+                <a:ea typeface="Tahoma" panose="020B0604030504040204" pitchFamily="34" charset="0"/>
+                <a:cs typeface="Tahoma" panose="020B0604030504040204" pitchFamily="34" charset="0"/>
+              </a:rPr>
+              <a:t>Answer </a:t>
+            </a:r>
+            <a:r>
+              <a:rPr lang="en-US" sz="2200" dirty="0">
+                <a:latin typeface="Tahoma" panose="020B0604030504040204" pitchFamily="34" charset="0"/>
+                <a:ea typeface="Tahoma" panose="020B0604030504040204" pitchFamily="34" charset="0"/>
+                <a:cs typeface="Tahoma" panose="020B0604030504040204" pitchFamily="34" charset="0"/>
+              </a:rPr>
+              <a:t>: Yes , From correlation table we observed few columns highly correlated to each other but majority  of it showed weak correlation.</a:t>
+            </a:r>
+          </a:p>
+          <a:p>
+            <a:endParaRPr lang="en-US" sz="2200" dirty="0">
+              <a:latin typeface="Tahoma" panose="020B0604030504040204" pitchFamily="34" charset="0"/>
+              <a:ea typeface="Tahoma" panose="020B0604030504040204" pitchFamily="34" charset="0"/>
+              <a:cs typeface="Tahoma" panose="020B0604030504040204" pitchFamily="34" charset="0"/>
+            </a:endParaRPr>
+          </a:p>
+          <a:p>
+            <a:r>
+              <a:rPr lang="en-US" sz="2200" b="1" dirty="0">
+                <a:latin typeface="Tahoma" panose="020B0604030504040204" pitchFamily="34" charset="0"/>
+                <a:ea typeface="Tahoma" panose="020B0604030504040204" pitchFamily="34" charset="0"/>
+                <a:cs typeface="Tahoma" panose="020B0604030504040204" pitchFamily="34" charset="0"/>
+              </a:rPr>
+              <a:t>4. How was the data collected?</a:t>
+            </a:r>
+          </a:p>
+          <a:p>
+            <a:r>
+              <a:rPr lang="en-US" sz="2200" b="1" dirty="0">
+                <a:latin typeface="Tahoma" panose="020B0604030504040204" pitchFamily="34" charset="0"/>
+                <a:ea typeface="Tahoma" panose="020B0604030504040204" pitchFamily="34" charset="0"/>
+                <a:cs typeface="Tahoma" panose="020B0604030504040204" pitchFamily="34" charset="0"/>
+              </a:rPr>
+              <a:t>Answer </a:t>
+            </a:r>
+            <a:r>
+              <a:rPr lang="en-US" sz="2200" dirty="0">
+                <a:latin typeface="Tahoma" panose="020B0604030504040204" pitchFamily="34" charset="0"/>
+                <a:ea typeface="Tahoma" panose="020B0604030504040204" pitchFamily="34" charset="0"/>
+                <a:cs typeface="Tahoma" panose="020B0604030504040204" pitchFamily="34" charset="0"/>
+              </a:rPr>
+              <a:t>: According to the Kaggle information, The dataset was collected from 2 APIs(names were not given), observing Accident events using AI Software, cameras, location information and nearby weather sensors.</a:t>
+            </a:r>
+          </a:p>
+          <a:p>
+            <a:endParaRPr lang="en-US" sz="2200" dirty="0">
+              <a:latin typeface="Tahoma" panose="020B0604030504040204" pitchFamily="34" charset="0"/>
+              <a:ea typeface="Tahoma" panose="020B0604030504040204" pitchFamily="34" charset="0"/>
+              <a:cs typeface="Tahoma" panose="020B0604030504040204" pitchFamily="34" charset="0"/>
+            </a:endParaRPr>
+          </a:p>
+          <a:p>
+            <a:r>
+              <a:rPr lang="en-US" sz="2200" b="1" dirty="0">
+                <a:latin typeface="Tahoma" panose="020B0604030504040204" pitchFamily="34" charset="0"/>
+                <a:ea typeface="Tahoma" panose="020B0604030504040204" pitchFamily="34" charset="0"/>
+                <a:cs typeface="Tahoma" panose="020B0604030504040204" pitchFamily="34" charset="0"/>
+              </a:rPr>
+              <a:t>5. Can you generate preliminary visualizations for individual features?</a:t>
+            </a:r>
+          </a:p>
+          <a:p>
+            <a:r>
+              <a:rPr lang="en-US" sz="2200" b="1" dirty="0">
+                <a:latin typeface="Tahoma" panose="020B0604030504040204" pitchFamily="34" charset="0"/>
+                <a:ea typeface="Tahoma" panose="020B0604030504040204" pitchFamily="34" charset="0"/>
+                <a:cs typeface="Tahoma" panose="020B0604030504040204" pitchFamily="34" charset="0"/>
+              </a:rPr>
+              <a:t>Answer </a:t>
+            </a:r>
+            <a:r>
+              <a:rPr lang="en-US" sz="2200" dirty="0">
+                <a:latin typeface="Tahoma" panose="020B0604030504040204" pitchFamily="34" charset="0"/>
+                <a:ea typeface="Tahoma" panose="020B0604030504040204" pitchFamily="34" charset="0"/>
+                <a:cs typeface="Tahoma" panose="020B0604030504040204" pitchFamily="34" charset="0"/>
+              </a:rPr>
+              <a:t>: Yes, We have added Some preliminary  visualization in  above slides.</a:t>
+            </a:r>
+          </a:p>
+          <a:p>
+            <a:endParaRPr lang="en-US" sz="2200" dirty="0">
+              <a:latin typeface="Tahoma" panose="020B0604030504040204" pitchFamily="34" charset="0"/>
+              <a:ea typeface="Tahoma" panose="020B0604030504040204" pitchFamily="34" charset="0"/>
+              <a:cs typeface="Tahoma" panose="020B0604030504040204" pitchFamily="34" charset="0"/>
+            </a:endParaRPr>
+          </a:p>
+          <a:p>
+            <a:endParaRPr lang="en-US" sz="2200" dirty="0">
+              <a:latin typeface="Tahoma" panose="020B0604030504040204" pitchFamily="34" charset="0"/>
+              <a:ea typeface="Tahoma" panose="020B0604030504040204" pitchFamily="34" charset="0"/>
+              <a:cs typeface="Tahoma" panose="020B0604030504040204" pitchFamily="34" charset="0"/>
+            </a:endParaRPr>
+          </a:p>
+          <a:p>
+            <a:endParaRPr lang="en-US" sz="2200" dirty="0">
+              <a:latin typeface="Tahoma" panose="020B0604030504040204" pitchFamily="34" charset="0"/>
+              <a:ea typeface="Tahoma" panose="020B0604030504040204" pitchFamily="34" charset="0"/>
+              <a:cs typeface="Tahoma" panose="020B0604030504040204" pitchFamily="34" charset="0"/>
+            </a:endParaRPr>
+          </a:p>
+          <a:p>
+            <a:endParaRPr lang="en-US" sz="2200" dirty="0">
+              <a:latin typeface="Tahoma" panose="020B0604030504040204" pitchFamily="34" charset="0"/>
+              <a:ea typeface="Tahoma" panose="020B0604030504040204" pitchFamily="34" charset="0"/>
+              <a:cs typeface="Tahoma" panose="020B0604030504040204" pitchFamily="34" charset="0"/>
+            </a:endParaRPr>
+          </a:p>
+          <a:p>
+            <a:endParaRPr lang="en-US" sz="2200" dirty="0">
+              <a:latin typeface="Tahoma" panose="020B0604030504040204" pitchFamily="34" charset="0"/>
+              <a:ea typeface="Tahoma" panose="020B0604030504040204" pitchFamily="34" charset="0"/>
+              <a:cs typeface="Tahoma" panose="020B0604030504040204" pitchFamily="34" charset="0"/>
+            </a:endParaRPr>
+          </a:p>
+          <a:p>
+            <a:endParaRPr lang="en-US" sz="2200" dirty="0">
+              <a:latin typeface="Tahoma" panose="020B0604030504040204" pitchFamily="34" charset="0"/>
+              <a:ea typeface="Tahoma" panose="020B0604030504040204" pitchFamily="34" charset="0"/>
+              <a:cs typeface="Tahoma" panose="020B0604030504040204" pitchFamily="34" charset="0"/>
+            </a:endParaRPr>
+          </a:p>
+          <a:p>
+            <a:endParaRPr lang="en-US" sz="2200" dirty="0">
+              <a:latin typeface="Tahoma" panose="020B0604030504040204" pitchFamily="34" charset="0"/>
+              <a:ea typeface="Tahoma" panose="020B0604030504040204" pitchFamily="34" charset="0"/>
+              <a:cs typeface="Tahoma" panose="020B0604030504040204" pitchFamily="34" charset="0"/>
+            </a:endParaRPr>
+          </a:p>
+        </p:txBody>
+      </p:sp>
+      <p:sp>
+        <p:nvSpPr>
+          <p:cNvPr id="13" name="object 6">
+            <a:extLst>
+              <a:ext uri="{FF2B5EF4-FFF2-40B4-BE49-F238E27FC236}">
+                <a16:creationId xmlns:a16="http://schemas.microsoft.com/office/drawing/2014/main" id="{8DF99E25-409F-4D40-9D11-F5ABD05ACEE8}"/>
+              </a:ext>
+            </a:extLst>
+          </p:cNvPr>
+          <p:cNvSpPr txBox="1"/>
+          <p:nvPr/>
+        </p:nvSpPr>
+        <p:spPr>
+          <a:xfrm>
+            <a:off x="1149541" y="9420058"/>
+            <a:ext cx="3403600" cy="257122"/>
           </a:xfrm>
           <a:prstGeom prst="rect">
             <a:avLst/>
@@ -20468,76 +20739,12 @@
               </a:spcBef>
             </a:pPr>
             <a:r>
-              <a:rPr sz="1400" spc="-35">
-                <a:latin typeface="Lucida Sans Unicode"/>
-                <a:cs typeface="Lucida Sans Unicode"/>
-              </a:rPr>
-              <a:t>The </a:t>
-            </a:r>
-            <a:r>
-              <a:rPr sz="1400" spc="30">
-                <a:latin typeface="Lucida Sans Unicode"/>
-                <a:cs typeface="Lucida Sans Unicode"/>
-              </a:rPr>
-              <a:t>Effects</a:t>
-            </a:r>
-            <a:r>
-              <a:rPr sz="1400" spc="-30">
-                <a:latin typeface="Lucida Sans Unicode"/>
-                <a:cs typeface="Lucida Sans Unicode"/>
-              </a:rPr>
-              <a:t> </a:t>
-            </a:r>
-            <a:r>
-              <a:rPr sz="1400" spc="-25">
-                <a:latin typeface="Lucida Sans Unicode"/>
-                <a:cs typeface="Lucida Sans Unicode"/>
-              </a:rPr>
-              <a:t>of</a:t>
-            </a:r>
-            <a:endParaRPr sz="1400">
-              <a:latin typeface="Lucida Sans Unicode"/>
-              <a:cs typeface="Lucida Sans Unicode"/>
-            </a:endParaRPr>
-          </a:p>
-          <a:p>
-            <a:pPr marL="12700">
-              <a:lnSpc>
-                <a:spcPct val="100000"/>
-              </a:lnSpc>
-              <a:spcBef>
-                <a:spcPts val="254"/>
-              </a:spcBef>
-            </a:pPr>
-            <a:r>
-              <a:rPr sz="1400" spc="-10">
-                <a:latin typeface="Lucida Sans Unicode"/>
-                <a:cs typeface="Lucida Sans Unicode"/>
-              </a:rPr>
-              <a:t>Technology</a:t>
-            </a:r>
-            <a:r>
-              <a:rPr sz="1400" spc="-30">
-                <a:latin typeface="Lucida Sans Unicode"/>
-                <a:cs typeface="Lucida Sans Unicode"/>
-              </a:rPr>
-              <a:t> </a:t>
-            </a:r>
-            <a:r>
-              <a:rPr sz="1400" spc="-35">
-                <a:latin typeface="Lucida Sans Unicode"/>
-                <a:cs typeface="Lucida Sans Unicode"/>
-              </a:rPr>
-              <a:t>on</a:t>
-            </a:r>
-            <a:r>
-              <a:rPr sz="1400" spc="-25">
-                <a:latin typeface="Lucida Sans Unicode"/>
-                <a:cs typeface="Lucida Sans Unicode"/>
-              </a:rPr>
-              <a:t> Learning</a:t>
-            </a:r>
-            <a:endParaRPr sz="1400">
+              <a:rPr lang="en-US" sz="1600" b="1" kern="1200" dirty="0">
+                <a:ea typeface="+mn-ea"/>
+              </a:rPr>
+              <a:t>A Countrywide Traffic Accident Dataset</a:t>
+            </a:r>
+            <a:endParaRPr sz="1600" b="1" dirty="0">
               <a:latin typeface="Lucida Sans Unicode"/>
               <a:cs typeface="Lucida Sans Unicode"/>
             </a:endParaRPr>
@@ -20546,15 +20753,23 @@
       </p:sp>
       <p:sp>
         <p:nvSpPr>
-          <p:cNvPr id="11" name="object 11"/>
+          <p:cNvPr id="14" name="object 7">
+            <a:extLst>
+              <a:ext uri="{FF2B5EF4-FFF2-40B4-BE49-F238E27FC236}">
+                <a16:creationId xmlns:a16="http://schemas.microsoft.com/office/drawing/2014/main" id="{AB6C79EC-C823-450F-B894-B662CD34D36F}"/>
+              </a:ext>
+            </a:extLst>
+          </p:cNvPr>
           <p:cNvSpPr txBox="1">
-            <a:spLocks noGrp="1"/>
+            <a:spLocks/>
           </p:cNvSpPr>
-          <p:nvPr>
-            <p:ph type="ftr" sz="quarter" idx="5"/>
-          </p:nvPr>
+          <p:nvPr/>
         </p:nvSpPr>
         <p:spPr>
+          <a:xfrm>
+            <a:off x="6650562" y="9420058"/>
+            <a:ext cx="6019800" cy="257122"/>
+          </a:xfrm>
           <a:prstGeom prst="rect">
             <a:avLst/>
           </a:prstGeom>
@@ -20563,87 +20778,140 @@
           <a:bodyPr vert="horz" wrap="square" lIns="0" tIns="10795" rIns="0" bIns="0" rtlCol="0">
             <a:spAutoFit/>
           </a:bodyPr>
-          <a:lstStyle/>
-          <a:p>
-            <a:pPr algn="ctr">
-              <a:lnSpc>
-                <a:spcPct val="100000"/>
-              </a:lnSpc>
+          <a:lstStyle>
+            <a:defPPr>
+              <a:defRPr lang="en-US"/>
+            </a:defPPr>
+            <a:lvl1pPr marL="0" algn="l" defTabSz="914400" rtl="0" eaLnBrk="1" latinLnBrk="0" hangingPunct="1">
+              <a:defRPr sz="1400" b="0" i="0" kern="1200">
+                <a:solidFill>
+                  <a:schemeClr val="tx1"/>
+                </a:solidFill>
+                <a:latin typeface="Lucida Sans Unicode"/>
+                <a:ea typeface="+mn-ea"/>
+                <a:cs typeface="Lucida Sans Unicode"/>
+              </a:defRPr>
+            </a:lvl1pPr>
+            <a:lvl2pPr marL="457200" algn="l" defTabSz="914400" rtl="0" eaLnBrk="1" latinLnBrk="0" hangingPunct="1">
+              <a:defRPr sz="1800" kern="1200">
+                <a:solidFill>
+                  <a:schemeClr val="tx1"/>
+                </a:solidFill>
+                <a:latin typeface="+mn-lt"/>
+                <a:ea typeface="+mn-ea"/>
+                <a:cs typeface="+mn-cs"/>
+              </a:defRPr>
+            </a:lvl2pPr>
+            <a:lvl3pPr marL="914400" algn="l" defTabSz="914400" rtl="0" eaLnBrk="1" latinLnBrk="0" hangingPunct="1">
+              <a:defRPr sz="1800" kern="1200">
+                <a:solidFill>
+                  <a:schemeClr val="tx1"/>
+                </a:solidFill>
+                <a:latin typeface="+mn-lt"/>
+                <a:ea typeface="+mn-ea"/>
+                <a:cs typeface="+mn-cs"/>
+              </a:defRPr>
+            </a:lvl3pPr>
+            <a:lvl4pPr marL="1371600" algn="l" defTabSz="914400" rtl="0" eaLnBrk="1" latinLnBrk="0" hangingPunct="1">
+              <a:defRPr sz="1800" kern="1200">
+                <a:solidFill>
+                  <a:schemeClr val="tx1"/>
+                </a:solidFill>
+                <a:latin typeface="+mn-lt"/>
+                <a:ea typeface="+mn-ea"/>
+                <a:cs typeface="+mn-cs"/>
+              </a:defRPr>
+            </a:lvl4pPr>
+            <a:lvl5pPr marL="1828800" algn="l" defTabSz="914400" rtl="0" eaLnBrk="1" latinLnBrk="0" hangingPunct="1">
+              <a:defRPr sz="1800" kern="1200">
+                <a:solidFill>
+                  <a:schemeClr val="tx1"/>
+                </a:solidFill>
+                <a:latin typeface="+mn-lt"/>
+                <a:ea typeface="+mn-ea"/>
+                <a:cs typeface="+mn-cs"/>
+              </a:defRPr>
+            </a:lvl5pPr>
+            <a:lvl6pPr marL="2286000" algn="l" defTabSz="914400" rtl="0" eaLnBrk="1" latinLnBrk="0" hangingPunct="1">
+              <a:defRPr sz="1800" kern="1200">
+                <a:solidFill>
+                  <a:schemeClr val="tx1"/>
+                </a:solidFill>
+                <a:latin typeface="+mn-lt"/>
+                <a:ea typeface="+mn-ea"/>
+                <a:cs typeface="+mn-cs"/>
+              </a:defRPr>
+            </a:lvl6pPr>
+            <a:lvl7pPr marL="2743200" algn="l" defTabSz="914400" rtl="0" eaLnBrk="1" latinLnBrk="0" hangingPunct="1">
+              <a:defRPr sz="1800" kern="1200">
+                <a:solidFill>
+                  <a:schemeClr val="tx1"/>
+                </a:solidFill>
+                <a:latin typeface="+mn-lt"/>
+                <a:ea typeface="+mn-ea"/>
+                <a:cs typeface="+mn-cs"/>
+              </a:defRPr>
+            </a:lvl7pPr>
+            <a:lvl8pPr marL="3200400" algn="l" defTabSz="914400" rtl="0" eaLnBrk="1" latinLnBrk="0" hangingPunct="1">
+              <a:defRPr sz="1800" kern="1200">
+                <a:solidFill>
+                  <a:schemeClr val="tx1"/>
+                </a:solidFill>
+                <a:latin typeface="+mn-lt"/>
+                <a:ea typeface="+mn-ea"/>
+                <a:cs typeface="+mn-cs"/>
+              </a:defRPr>
+            </a:lvl8pPr>
+            <a:lvl9pPr marL="3657600" algn="l" defTabSz="914400" rtl="0" eaLnBrk="1" latinLnBrk="0" hangingPunct="1">
+              <a:defRPr sz="1800" kern="1200">
+                <a:solidFill>
+                  <a:schemeClr val="tx1"/>
+                </a:solidFill>
+                <a:latin typeface="+mn-lt"/>
+                <a:ea typeface="+mn-ea"/>
+                <a:cs typeface="+mn-cs"/>
+              </a:defRPr>
+            </a:lvl9pPr>
+          </a:lstStyle>
+          <a:p>
+            <a:pPr marL="12700">
               <a:spcBef>
                 <a:spcPts val="85"/>
               </a:spcBef>
             </a:pPr>
             <a:r>
-              <a:rPr spc="-40"/>
-              <a:t>A</a:t>
-            </a:r>
-            <a:r>
-              <a:rPr spc="-30"/>
-              <a:t> </a:t>
-            </a:r>
-            <a:r>
-              <a:rPr spc="-5"/>
-              <a:t>school</a:t>
-            </a:r>
-            <a:r>
-              <a:rPr spc="-25"/>
-              <a:t> </a:t>
-            </a:r>
-            <a:r>
-              <a:rPr spc="15"/>
-              <a:t>project</a:t>
-            </a:r>
-          </a:p>
-          <a:p>
-            <a:pPr algn="ctr">
-              <a:lnSpc>
-                <a:spcPct val="100000"/>
-              </a:lnSpc>
-              <a:spcBef>
-                <a:spcPts val="254"/>
-              </a:spcBef>
-            </a:pPr>
-            <a:r>
-              <a:rPr spc="15"/>
-              <a:t>presented</a:t>
-            </a:r>
-            <a:r>
-              <a:rPr spc="-25"/>
-              <a:t> </a:t>
-            </a:r>
-            <a:r>
-              <a:rPr spc="35"/>
-              <a:t>by</a:t>
-            </a:r>
-            <a:r>
-              <a:rPr spc="-25"/>
-              <a:t> </a:t>
-            </a:r>
-            <a:r>
-              <a:t>Group</a:t>
-            </a:r>
-            <a:r>
-              <a:rPr spc="-25"/>
-              <a:t> </a:t>
-            </a:r>
-            <a:r>
-              <a:rPr spc="-40"/>
-              <a:t>A</a:t>
-            </a:r>
+              <a:rPr lang="en-US" sz="1600" b="1">
+                <a:latin typeface="+mn-lt"/>
+                <a:cs typeface="+mn-cs"/>
+              </a:rPr>
+              <a:t>DAB103-21S-003 (Analytical Tools &amp; Decision Making 21 Spring - 003)</a:t>
+            </a:r>
+            <a:endParaRPr lang="en-US" sz="1600" b="1" dirty="0">
+              <a:latin typeface="+mn-lt"/>
+              <a:cs typeface="+mn-cs"/>
+            </a:endParaRPr>
           </a:p>
         </p:txBody>
       </p:sp>
       <p:sp>
         <p:nvSpPr>
-          <p:cNvPr id="12" name="object 12"/>
+          <p:cNvPr id="15" name="object 8">
+            <a:extLst>
+              <a:ext uri="{FF2B5EF4-FFF2-40B4-BE49-F238E27FC236}">
+                <a16:creationId xmlns:a16="http://schemas.microsoft.com/office/drawing/2014/main" id="{2D9551F2-15F1-4F12-B1C7-8707AB683756}"/>
+              </a:ext>
+            </a:extLst>
+          </p:cNvPr>
           <p:cNvSpPr txBox="1">
-            <a:spLocks noGrp="1"/>
+            <a:spLocks/>
           </p:cNvSpPr>
-          <p:nvPr>
-            <p:ph type="dt" sz="half" idx="6"/>
-          </p:nvPr>
+          <p:nvPr/>
         </p:nvSpPr>
         <p:spPr>
+          <a:xfrm>
+            <a:off x="15803369" y="9420058"/>
+            <a:ext cx="1807844" cy="257122"/>
+          </a:xfrm>
           <a:prstGeom prst="rect">
             <a:avLst/>
           </a:prstGeom>
@@ -20652,339 +20920,102 @@
           <a:bodyPr vert="horz" wrap="square" lIns="0" tIns="10795" rIns="0" bIns="0" rtlCol="0">
             <a:spAutoFit/>
           </a:bodyPr>
-          <a:lstStyle/>
-          <a:p>
-            <a:pPr marL="12700">
-              <a:lnSpc>
-                <a:spcPct val="100000"/>
-              </a:lnSpc>
+          <a:lstStyle>
+            <a:defPPr>
+              <a:defRPr lang="en-US"/>
+            </a:defPPr>
+            <a:lvl1pPr marL="12700">
               <a:spcBef>
                 <a:spcPts val="85"/>
               </a:spcBef>
-            </a:pPr>
-            <a:r>
-              <a:rPr spc="5"/>
-              <a:t>September,</a:t>
-            </a:r>
-            <a:r>
-              <a:rPr spc="-30"/>
-              <a:t> </a:t>
-            </a:r>
-            <a:r>
-              <a:rPr spc="-45"/>
-              <a:t>28</a:t>
-            </a:r>
-            <a:r>
-              <a:rPr spc="-30"/>
-              <a:t> </a:t>
-            </a:r>
-            <a:r>
-              <a:rPr spc="20"/>
-              <a:t>2020</a:t>
-            </a:r>
-          </a:p>
-        </p:txBody>
-      </p:sp>
-      <p:sp>
-        <p:nvSpPr>
-          <p:cNvPr id="7" name="object 7"/>
-          <p:cNvSpPr txBox="1"/>
-          <p:nvPr/>
-        </p:nvSpPr>
-        <p:spPr>
-          <a:xfrm>
-            <a:off x="1123111" y="2516519"/>
-            <a:ext cx="15970759" cy="7399462"/>
-          </a:xfrm>
-          <a:prstGeom prst="rect">
-            <a:avLst/>
-          </a:prstGeom>
-        </p:spPr>
-        <p:txBody>
-          <a:bodyPr vert="horz" wrap="square" lIns="0" tIns="12700" rIns="0" bIns="0" rtlCol="0" anchor="t">
-            <a:spAutoFit/>
-          </a:bodyPr>
-          <a:lstStyle/>
-          <a:p>
-            <a:r>
-              <a:rPr lang="en-US" sz="2000" b="1">
-                <a:latin typeface="Calibri"/>
-                <a:cs typeface="Calibri"/>
-              </a:rPr>
-              <a:t>1. Does</a:t>
-            </a:r>
-            <a:r>
-              <a:rPr lang="en-US" sz="2000" b="1" i="0" u="none" strike="noStrike" baseline="0">
-                <a:latin typeface="Calibri"/>
-                <a:cs typeface="Calibri"/>
-              </a:rPr>
-              <a:t> the data include missing, incomplete or invalid records?</a:t>
-            </a:r>
-          </a:p>
-          <a:p>
-            <a:r>
-              <a:rPr lang="en-US" sz="2000" b="1">
-                <a:latin typeface="Calibri"/>
-                <a:cs typeface="Calibri"/>
-              </a:rPr>
-              <a:t>Answer </a:t>
-            </a:r>
-            <a:r>
-              <a:rPr lang="en-US" sz="2000">
-                <a:latin typeface="Calibri"/>
-                <a:cs typeface="Calibri"/>
-              </a:rPr>
-              <a:t>: From the initial observation, looks like almost  40% of the data in the dataset is having null or missing values which will be discovered and removed in dataset cleanup part.</a:t>
-            </a:r>
-            <a:endParaRPr lang="en-US"/>
-          </a:p>
-          <a:p>
-            <a:endParaRPr lang="en-US" sz="2000">
-              <a:latin typeface="Calibri"/>
-              <a:cs typeface="Calibri"/>
-            </a:endParaRPr>
-          </a:p>
-          <a:p>
-            <a:r>
-              <a:rPr lang="en-US" sz="2000" b="1">
-                <a:latin typeface="Calibri"/>
-                <a:cs typeface="Calibri"/>
-              </a:rPr>
-              <a:t>2. Is the data imbalanced (large number of the records represent a majority class and very few records represent the minority class)?</a:t>
-            </a:r>
-            <a:endParaRPr lang="en-US" b="1">
-              <a:cs typeface="Calibri"/>
-            </a:endParaRPr>
-          </a:p>
-          <a:p>
-            <a:r>
-              <a:rPr lang="en-US" sz="2000" b="1">
-                <a:latin typeface="Calibri"/>
-                <a:cs typeface="Calibri"/>
-              </a:rPr>
-              <a:t>Answer </a:t>
-            </a:r>
-            <a:r>
-              <a:rPr lang="en-US" sz="2000">
-                <a:latin typeface="Calibri"/>
-                <a:cs typeface="Calibri"/>
-              </a:rPr>
-              <a:t>: Yes , Many columns such as city, states, bump </a:t>
-            </a:r>
-            <a:r>
-              <a:rPr lang="en-US" sz="2000" err="1">
-                <a:latin typeface="Calibri"/>
-                <a:cs typeface="Calibri"/>
-              </a:rPr>
-              <a:t>etc</a:t>
-            </a:r>
-            <a:r>
-              <a:rPr lang="en-US" sz="2000">
-                <a:latin typeface="Calibri"/>
-                <a:cs typeface="Calibri"/>
-              </a:rPr>
-              <a:t> are having division in large number of the records represent a majority class and very few records represent the minority class.</a:t>
-            </a:r>
-          </a:p>
-          <a:p>
-            <a:endParaRPr lang="en-US" sz="2000">
-              <a:latin typeface="Calibri"/>
-              <a:cs typeface="Calibri"/>
-            </a:endParaRPr>
-          </a:p>
-          <a:p>
-            <a:r>
-              <a:rPr lang="en-US" sz="2000" b="1">
-                <a:latin typeface="Calibri"/>
-                <a:cs typeface="Calibri"/>
-              </a:rPr>
-              <a:t>3. Are some data elements highly correlated with each other?</a:t>
-            </a:r>
-            <a:endParaRPr lang="en-US" sz="2000" b="1">
-              <a:ea typeface="+mn-lt"/>
-              <a:cs typeface="+mn-lt"/>
-            </a:endParaRPr>
-          </a:p>
-          <a:p>
-            <a:r>
-              <a:rPr lang="en-US" sz="2000" b="1">
-                <a:latin typeface="Calibri"/>
-                <a:cs typeface="Calibri"/>
-              </a:rPr>
-              <a:t>Answer </a:t>
-            </a:r>
-            <a:r>
-              <a:rPr lang="en-US" sz="2000">
-                <a:latin typeface="Calibri"/>
-                <a:cs typeface="Calibri"/>
-              </a:rPr>
-              <a:t>: Yes , From correlation table we observed few columns highly correlated to each other but majority  of it showed weak correlation.</a:t>
-            </a:r>
-            <a:endParaRPr lang="en-US"/>
-          </a:p>
-          <a:p>
-            <a:endParaRPr lang="en-US" sz="2000">
-              <a:latin typeface="Calibri"/>
-              <a:cs typeface="Calibri"/>
-            </a:endParaRPr>
-          </a:p>
-          <a:p>
-            <a:r>
-              <a:rPr lang="en-US" sz="2000" b="1">
-                <a:latin typeface="Calibri"/>
-                <a:cs typeface="Calibri"/>
-              </a:rPr>
-              <a:t>4. How was the data collected?</a:t>
-            </a:r>
-            <a:endParaRPr lang="en-US" sz="2000" b="1">
-              <a:ea typeface="+mn-lt"/>
-              <a:cs typeface="+mn-lt"/>
-            </a:endParaRPr>
-          </a:p>
-          <a:p>
-            <a:r>
-              <a:rPr lang="en-US" sz="2000" b="1">
-                <a:latin typeface="Calibri"/>
-                <a:cs typeface="Calibri"/>
-              </a:rPr>
-              <a:t>Answer </a:t>
-            </a:r>
-            <a:r>
-              <a:rPr lang="en-US" sz="2000">
-                <a:latin typeface="Calibri"/>
-                <a:cs typeface="Calibri"/>
-              </a:rPr>
-              <a:t>: According to the Kaggle information, The dataset was collected from 2 APIs(names were not given), observing Accident events using AI Software, cameras, location information and nearby weather sensors.</a:t>
-            </a:r>
-            <a:endParaRPr lang="en-US"/>
-          </a:p>
-          <a:p>
-            <a:endParaRPr lang="en-US" sz="2000">
-              <a:latin typeface="Calibri"/>
-              <a:cs typeface="Calibri"/>
-            </a:endParaRPr>
-          </a:p>
-          <a:p>
-            <a:r>
-              <a:rPr lang="en-US" sz="2000" b="1">
-                <a:latin typeface="Calibri"/>
-                <a:cs typeface="Calibri"/>
-              </a:rPr>
-              <a:t>5. Can you generate preliminary visualizations for individual features?</a:t>
-            </a:r>
-            <a:endParaRPr lang="en-US" sz="2000" b="1">
-              <a:ea typeface="+mn-lt"/>
-              <a:cs typeface="+mn-lt"/>
-            </a:endParaRPr>
-          </a:p>
-          <a:p>
-            <a:r>
-              <a:rPr lang="en-US" sz="2000" b="1">
-                <a:latin typeface="Calibri"/>
-                <a:cs typeface="Calibri"/>
-              </a:rPr>
-              <a:t>Answer </a:t>
-            </a:r>
-            <a:r>
-              <a:rPr lang="en-US" sz="2000">
-                <a:latin typeface="Calibri"/>
-                <a:cs typeface="Calibri"/>
-              </a:rPr>
-              <a:t>: Yes, We have added Some preliminary  visualization in  above slides.</a:t>
-            </a:r>
-            <a:endParaRPr lang="en-US"/>
-          </a:p>
-          <a:p>
-            <a:endParaRPr lang="en-US" sz="2000">
-              <a:latin typeface="Calibri"/>
-              <a:cs typeface="Calibri"/>
-            </a:endParaRPr>
-          </a:p>
-          <a:p>
-            <a:endParaRPr lang="en-US" sz="2000">
-              <a:latin typeface="Calibri"/>
-              <a:cs typeface="Calibri"/>
-            </a:endParaRPr>
-          </a:p>
-          <a:p>
-            <a:endParaRPr lang="en-US" sz="2000">
-              <a:latin typeface="Calibri"/>
-              <a:cs typeface="Calibri"/>
-            </a:endParaRPr>
-          </a:p>
-          <a:p>
-            <a:endParaRPr lang="en-US" sz="2000">
-              <a:latin typeface="Calibri"/>
-              <a:cs typeface="Calibri"/>
-            </a:endParaRPr>
-          </a:p>
-          <a:p>
-            <a:endParaRPr lang="en-US" sz="2000">
-              <a:latin typeface="Calibri"/>
-              <a:cs typeface="Calibri"/>
-            </a:endParaRPr>
-          </a:p>
-          <a:p>
-            <a:endParaRPr lang="en-US" sz="2000">
-              <a:latin typeface="Calibri"/>
-              <a:cs typeface="Calibri"/>
-            </a:endParaRPr>
-          </a:p>
-          <a:p>
-            <a:endParaRPr lang="en-US" sz="2000">
-              <a:latin typeface="Calibri"/>
-              <a:cs typeface="Calibri"/>
-            </a:endParaRPr>
-          </a:p>
-        </p:txBody>
-      </p:sp>
-      <p:sp>
-        <p:nvSpPr>
-          <p:cNvPr id="9" name="object 9"/>
-          <p:cNvSpPr txBox="1"/>
-          <p:nvPr/>
-        </p:nvSpPr>
-        <p:spPr>
-          <a:xfrm>
-            <a:off x="16934702" y="825936"/>
-            <a:ext cx="337820" cy="299720"/>
-          </a:xfrm>
-          <a:prstGeom prst="rect">
-            <a:avLst/>
-          </a:prstGeom>
-        </p:spPr>
-        <p:txBody>
-          <a:bodyPr vert="horz" wrap="square" lIns="0" tIns="12065" rIns="0" bIns="0" rtlCol="0">
-            <a:spAutoFit/>
-          </a:bodyPr>
-          <a:lstStyle/>
-          <a:p>
-            <a:pPr marL="12700">
-              <a:lnSpc>
-                <a:spcPct val="100000"/>
-              </a:lnSpc>
-              <a:spcBef>
-                <a:spcPts val="95"/>
-              </a:spcBef>
-            </a:pPr>
-            <a:r>
-              <a:rPr sz="1800" b="1" spc="315">
-                <a:latin typeface="Arial"/>
-                <a:cs typeface="Arial"/>
-              </a:rPr>
-              <a:t>0</a:t>
-            </a:r>
-            <a:r>
-              <a:rPr sz="1800" b="1" spc="135">
-                <a:latin typeface="Arial"/>
-                <a:cs typeface="Arial"/>
-              </a:rPr>
-              <a:t>9</a:t>
-            </a:r>
-            <a:endParaRPr sz="1800">
-              <a:latin typeface="Arial"/>
-              <a:cs typeface="Arial"/>
-            </a:endParaRPr>
+              <a:defRPr sz="1600" b="1" i="0"/>
+            </a:lvl1pPr>
+            <a:lvl2pPr marL="457200" algn="l" defTabSz="914400" rtl="0" eaLnBrk="1" latinLnBrk="0" hangingPunct="1">
+              <a:defRPr sz="1800" kern="1200">
+                <a:solidFill>
+                  <a:schemeClr val="tx1"/>
+                </a:solidFill>
+                <a:latin typeface="+mn-lt"/>
+                <a:ea typeface="+mn-ea"/>
+                <a:cs typeface="+mn-cs"/>
+              </a:defRPr>
+            </a:lvl2pPr>
+            <a:lvl3pPr marL="914400" algn="l" defTabSz="914400" rtl="0" eaLnBrk="1" latinLnBrk="0" hangingPunct="1">
+              <a:defRPr sz="1800" kern="1200">
+                <a:solidFill>
+                  <a:schemeClr val="tx1"/>
+                </a:solidFill>
+                <a:latin typeface="+mn-lt"/>
+                <a:ea typeface="+mn-ea"/>
+                <a:cs typeface="+mn-cs"/>
+              </a:defRPr>
+            </a:lvl3pPr>
+            <a:lvl4pPr marL="1371600" algn="l" defTabSz="914400" rtl="0" eaLnBrk="1" latinLnBrk="0" hangingPunct="1">
+              <a:defRPr sz="1800" kern="1200">
+                <a:solidFill>
+                  <a:schemeClr val="tx1"/>
+                </a:solidFill>
+                <a:latin typeface="+mn-lt"/>
+                <a:ea typeface="+mn-ea"/>
+                <a:cs typeface="+mn-cs"/>
+              </a:defRPr>
+            </a:lvl4pPr>
+            <a:lvl5pPr marL="1828800" algn="l" defTabSz="914400" rtl="0" eaLnBrk="1" latinLnBrk="0" hangingPunct="1">
+              <a:defRPr sz="1800" kern="1200">
+                <a:solidFill>
+                  <a:schemeClr val="tx1"/>
+                </a:solidFill>
+                <a:latin typeface="+mn-lt"/>
+                <a:ea typeface="+mn-ea"/>
+                <a:cs typeface="+mn-cs"/>
+              </a:defRPr>
+            </a:lvl5pPr>
+            <a:lvl6pPr marL="2286000" algn="l" defTabSz="914400" rtl="0" eaLnBrk="1" latinLnBrk="0" hangingPunct="1">
+              <a:defRPr sz="1800" kern="1200">
+                <a:solidFill>
+                  <a:schemeClr val="tx1"/>
+                </a:solidFill>
+                <a:latin typeface="+mn-lt"/>
+                <a:ea typeface="+mn-ea"/>
+                <a:cs typeface="+mn-cs"/>
+              </a:defRPr>
+            </a:lvl6pPr>
+            <a:lvl7pPr marL="2743200" algn="l" defTabSz="914400" rtl="0" eaLnBrk="1" latinLnBrk="0" hangingPunct="1">
+              <a:defRPr sz="1800" kern="1200">
+                <a:solidFill>
+                  <a:schemeClr val="tx1"/>
+                </a:solidFill>
+                <a:latin typeface="+mn-lt"/>
+                <a:ea typeface="+mn-ea"/>
+                <a:cs typeface="+mn-cs"/>
+              </a:defRPr>
+            </a:lvl7pPr>
+            <a:lvl8pPr marL="3200400" algn="l" defTabSz="914400" rtl="0" eaLnBrk="1" latinLnBrk="0" hangingPunct="1">
+              <a:defRPr sz="1800" kern="1200">
+                <a:solidFill>
+                  <a:schemeClr val="tx1"/>
+                </a:solidFill>
+                <a:latin typeface="+mn-lt"/>
+                <a:ea typeface="+mn-ea"/>
+                <a:cs typeface="+mn-cs"/>
+              </a:defRPr>
+            </a:lvl8pPr>
+            <a:lvl9pPr marL="3657600" algn="l" defTabSz="914400" rtl="0" eaLnBrk="1" latinLnBrk="0" hangingPunct="1">
+              <a:defRPr sz="1800" kern="1200">
+                <a:solidFill>
+                  <a:schemeClr val="tx1"/>
+                </a:solidFill>
+                <a:latin typeface="+mn-lt"/>
+                <a:ea typeface="+mn-ea"/>
+                <a:cs typeface="+mn-cs"/>
+              </a:defRPr>
+            </a:lvl9pPr>
+          </a:lstStyle>
+          <a:p>
+            <a:r>
+              <a:rPr lang="en-US" dirty="0"/>
+              <a:t>June,29 2021</a:t>
+            </a:r>
           </a:p>
         </p:txBody>
       </p:sp>
@@ -21104,58 +21135,6 @@
       </p:sp>
       <p:sp>
         <p:nvSpPr>
-          <p:cNvPr id="11" name="object 11"/>
-          <p:cNvSpPr txBox="1">
-            <a:spLocks noGrp="1"/>
-          </p:cNvSpPr>
-          <p:nvPr>
-            <p:ph type="dt" sz="half" idx="6"/>
-          </p:nvPr>
-        </p:nvSpPr>
-        <p:spPr>
-          <a:prstGeom prst="rect">
-            <a:avLst/>
-          </a:prstGeom>
-        </p:spPr>
-        <p:txBody>
-          <a:bodyPr vert="horz" wrap="square" lIns="0" tIns="10795" rIns="0" bIns="0" rtlCol="0">
-            <a:spAutoFit/>
-          </a:bodyPr>
-          <a:lstStyle/>
-          <a:p>
-            <a:pPr marL="12700">
-              <a:lnSpc>
-                <a:spcPct val="100000"/>
-              </a:lnSpc>
-              <a:spcBef>
-                <a:spcPts val="85"/>
-              </a:spcBef>
-            </a:pPr>
-            <a:r>
-              <a:rPr spc="5"/>
-              <a:t>September,</a:t>
-            </a:r>
-            <a:r>
-              <a:rPr spc="-30"/>
-              <a:t> </a:t>
-            </a:r>
-            <a:r>
-              <a:rPr spc="-45"/>
-              <a:t>28</a:t>
-            </a:r>
-            <a:r>
-              <a:rPr spc="-30"/>
-              <a:t> </a:t>
-            </a:r>
-            <a:r>
-              <a:rPr spc="20"/>
-              <a:t>2020</a:t>
-            </a:r>
-          </a:p>
-        </p:txBody>
-      </p:sp>
-      <p:sp>
-        <p:nvSpPr>
           <p:cNvPr id="6" name="object 6"/>
           <p:cNvSpPr txBox="1"/>
           <p:nvPr/>
@@ -21255,56 +21234,6 @@
               </a:rPr>
               <a:t>Task 3 – Teach Alexa to find answer from EDA graphs Plotted in the notebook (If time Permits)</a:t>
             </a:r>
-          </a:p>
-        </p:txBody>
-      </p:sp>
-      <p:sp>
-        <p:nvSpPr>
-          <p:cNvPr id="8" name="object 8"/>
-          <p:cNvSpPr txBox="1"/>
-          <p:nvPr/>
-        </p:nvSpPr>
-        <p:spPr>
-          <a:xfrm>
-            <a:off x="17018026" y="825936"/>
-            <a:ext cx="254635" cy="299720"/>
-          </a:xfrm>
-          <a:prstGeom prst="rect">
-            <a:avLst/>
-          </a:prstGeom>
-        </p:spPr>
-        <p:txBody>
-          <a:bodyPr vert="horz" wrap="square" lIns="0" tIns="12065" rIns="0" bIns="0" rtlCol="0">
-            <a:spAutoFit/>
-          </a:bodyPr>
-          <a:lstStyle/>
-          <a:p>
-            <a:pPr marL="12700">
-              <a:lnSpc>
-                <a:spcPct val="100000"/>
-              </a:lnSpc>
-              <a:spcBef>
-                <a:spcPts val="95"/>
-              </a:spcBef>
-            </a:pPr>
-            <a:r>
-              <a:rPr sz="1800" b="1" spc="-395">
-                <a:latin typeface="Trebuchet MS"/>
-                <a:cs typeface="Trebuchet MS"/>
-              </a:rPr>
-              <a:t>1</a:t>
-            </a:r>
-            <a:r>
-              <a:rPr sz="1800" b="1" spc="85">
-                <a:latin typeface="Trebuchet MS"/>
-                <a:cs typeface="Trebuchet MS"/>
-              </a:rPr>
-              <a:t>9</a:t>
-            </a:r>
-            <a:endParaRPr sz="1800">
-              <a:latin typeface="Trebuchet MS"/>
-              <a:cs typeface="Trebuchet MS"/>
-            </a:endParaRPr>
           </a:p>
         </p:txBody>
       </p:sp>
@@ -21398,6 +21327,322 @@
           </a:prstGeom>
         </p:spPr>
       </p:pic>
+      <p:sp>
+        <p:nvSpPr>
+          <p:cNvPr id="10" name="object 6">
+            <a:extLst>
+              <a:ext uri="{FF2B5EF4-FFF2-40B4-BE49-F238E27FC236}">
+                <a16:creationId xmlns:a16="http://schemas.microsoft.com/office/drawing/2014/main" id="{77967186-22D1-4016-9176-758C1ED5BAB1}"/>
+              </a:ext>
+            </a:extLst>
+          </p:cNvPr>
+          <p:cNvSpPr txBox="1"/>
+          <p:nvPr/>
+        </p:nvSpPr>
+        <p:spPr>
+          <a:xfrm>
+            <a:off x="1149541" y="9420058"/>
+            <a:ext cx="3403600" cy="257122"/>
+          </a:xfrm>
+          <a:prstGeom prst="rect">
+            <a:avLst/>
+          </a:prstGeom>
+        </p:spPr>
+        <p:txBody>
+          <a:bodyPr vert="horz" wrap="square" lIns="0" tIns="10795" rIns="0" bIns="0" rtlCol="0">
+            <a:spAutoFit/>
+          </a:bodyPr>
+          <a:lstStyle/>
+          <a:p>
+            <a:pPr marL="12700">
+              <a:lnSpc>
+                <a:spcPct val="100000"/>
+              </a:lnSpc>
+              <a:spcBef>
+                <a:spcPts val="85"/>
+              </a:spcBef>
+            </a:pPr>
+            <a:r>
+              <a:rPr lang="en-US" sz="1600" b="1" kern="1200" dirty="0">
+                <a:ea typeface="+mn-ea"/>
+              </a:rPr>
+              <a:t>A Countrywide Traffic Accident Dataset</a:t>
+            </a:r>
+            <a:endParaRPr sz="1600" b="1" dirty="0">
+              <a:latin typeface="Lucida Sans Unicode"/>
+              <a:cs typeface="Lucida Sans Unicode"/>
+            </a:endParaRPr>
+          </a:p>
+        </p:txBody>
+      </p:sp>
+      <p:sp>
+        <p:nvSpPr>
+          <p:cNvPr id="12" name="object 7">
+            <a:extLst>
+              <a:ext uri="{FF2B5EF4-FFF2-40B4-BE49-F238E27FC236}">
+                <a16:creationId xmlns:a16="http://schemas.microsoft.com/office/drawing/2014/main" id="{744F690E-4D73-4A75-8673-63DCCACAF4B1}"/>
+              </a:ext>
+            </a:extLst>
+          </p:cNvPr>
+          <p:cNvSpPr txBox="1">
+            <a:spLocks/>
+          </p:cNvSpPr>
+          <p:nvPr/>
+        </p:nvSpPr>
+        <p:spPr>
+          <a:xfrm>
+            <a:off x="6650562" y="9420058"/>
+            <a:ext cx="6019800" cy="257122"/>
+          </a:xfrm>
+          <a:prstGeom prst="rect">
+            <a:avLst/>
+          </a:prstGeom>
+        </p:spPr>
+        <p:txBody>
+          <a:bodyPr vert="horz" wrap="square" lIns="0" tIns="10795" rIns="0" bIns="0" rtlCol="0">
+            <a:spAutoFit/>
+          </a:bodyPr>
+          <a:lstStyle>
+            <a:defPPr>
+              <a:defRPr lang="en-US"/>
+            </a:defPPr>
+            <a:lvl1pPr marL="0" algn="l" defTabSz="914400" rtl="0" eaLnBrk="1" latinLnBrk="0" hangingPunct="1">
+              <a:defRPr sz="1400" b="0" i="0" kern="1200">
+                <a:solidFill>
+                  <a:schemeClr val="tx1"/>
+                </a:solidFill>
+                <a:latin typeface="Lucida Sans Unicode"/>
+                <a:ea typeface="+mn-ea"/>
+                <a:cs typeface="Lucida Sans Unicode"/>
+              </a:defRPr>
+            </a:lvl1pPr>
+            <a:lvl2pPr marL="457200" algn="l" defTabSz="914400" rtl="0" eaLnBrk="1" latinLnBrk="0" hangingPunct="1">
+              <a:defRPr sz="1800" kern="1200">
+                <a:solidFill>
+                  <a:schemeClr val="tx1"/>
+                </a:solidFill>
+                <a:latin typeface="+mn-lt"/>
+                <a:ea typeface="+mn-ea"/>
+                <a:cs typeface="+mn-cs"/>
+              </a:defRPr>
+            </a:lvl2pPr>
+            <a:lvl3pPr marL="914400" algn="l" defTabSz="914400" rtl="0" eaLnBrk="1" latinLnBrk="0" hangingPunct="1">
+              <a:defRPr sz="1800" kern="1200">
+                <a:solidFill>
+                  <a:schemeClr val="tx1"/>
+                </a:solidFill>
+                <a:latin typeface="+mn-lt"/>
+                <a:ea typeface="+mn-ea"/>
+                <a:cs typeface="+mn-cs"/>
+              </a:defRPr>
+            </a:lvl3pPr>
+            <a:lvl4pPr marL="1371600" algn="l" defTabSz="914400" rtl="0" eaLnBrk="1" latinLnBrk="0" hangingPunct="1">
+              <a:defRPr sz="1800" kern="1200">
+                <a:solidFill>
+                  <a:schemeClr val="tx1"/>
+                </a:solidFill>
+                <a:latin typeface="+mn-lt"/>
+                <a:ea typeface="+mn-ea"/>
+                <a:cs typeface="+mn-cs"/>
+              </a:defRPr>
+            </a:lvl4pPr>
+            <a:lvl5pPr marL="1828800" algn="l" defTabSz="914400" rtl="0" eaLnBrk="1" latinLnBrk="0" hangingPunct="1">
+              <a:defRPr sz="1800" kern="1200">
+                <a:solidFill>
+                  <a:schemeClr val="tx1"/>
+                </a:solidFill>
+                <a:latin typeface="+mn-lt"/>
+                <a:ea typeface="+mn-ea"/>
+                <a:cs typeface="+mn-cs"/>
+              </a:defRPr>
+            </a:lvl5pPr>
+            <a:lvl6pPr marL="2286000" algn="l" defTabSz="914400" rtl="0" eaLnBrk="1" latinLnBrk="0" hangingPunct="1">
+              <a:defRPr sz="1800" kern="1200">
+                <a:solidFill>
+                  <a:schemeClr val="tx1"/>
+                </a:solidFill>
+                <a:latin typeface="+mn-lt"/>
+                <a:ea typeface="+mn-ea"/>
+                <a:cs typeface="+mn-cs"/>
+              </a:defRPr>
+            </a:lvl6pPr>
+            <a:lvl7pPr marL="2743200" algn="l" defTabSz="914400" rtl="0" eaLnBrk="1" latinLnBrk="0" hangingPunct="1">
+              <a:defRPr sz="1800" kern="1200">
+                <a:solidFill>
+                  <a:schemeClr val="tx1"/>
+                </a:solidFill>
+                <a:latin typeface="+mn-lt"/>
+                <a:ea typeface="+mn-ea"/>
+                <a:cs typeface="+mn-cs"/>
+              </a:defRPr>
+            </a:lvl7pPr>
+            <a:lvl8pPr marL="3200400" algn="l" defTabSz="914400" rtl="0" eaLnBrk="1" latinLnBrk="0" hangingPunct="1">
+              <a:defRPr sz="1800" kern="1200">
+                <a:solidFill>
+                  <a:schemeClr val="tx1"/>
+                </a:solidFill>
+                <a:latin typeface="+mn-lt"/>
+                <a:ea typeface="+mn-ea"/>
+                <a:cs typeface="+mn-cs"/>
+              </a:defRPr>
+            </a:lvl8pPr>
+            <a:lvl9pPr marL="3657600" algn="l" defTabSz="914400" rtl="0" eaLnBrk="1" latinLnBrk="0" hangingPunct="1">
+              <a:defRPr sz="1800" kern="1200">
+                <a:solidFill>
+                  <a:schemeClr val="tx1"/>
+                </a:solidFill>
+                <a:latin typeface="+mn-lt"/>
+                <a:ea typeface="+mn-ea"/>
+                <a:cs typeface="+mn-cs"/>
+              </a:defRPr>
+            </a:lvl9pPr>
+          </a:lstStyle>
+          <a:p>
+            <a:pPr marL="12700">
+              <a:spcBef>
+                <a:spcPts val="85"/>
+              </a:spcBef>
+            </a:pPr>
+            <a:r>
+              <a:rPr lang="en-US" sz="1600" b="1">
+                <a:latin typeface="+mn-lt"/>
+                <a:cs typeface="+mn-cs"/>
+              </a:rPr>
+              <a:t>DAB103-21S-003 (Analytical Tools &amp; Decision Making 21 Spring - 003)</a:t>
+            </a:r>
+            <a:endParaRPr lang="en-US" sz="1600" b="1" dirty="0">
+              <a:latin typeface="+mn-lt"/>
+              <a:cs typeface="+mn-cs"/>
+            </a:endParaRPr>
+          </a:p>
+        </p:txBody>
+      </p:sp>
+      <p:sp>
+        <p:nvSpPr>
+          <p:cNvPr id="13" name="object 8">
+            <a:extLst>
+              <a:ext uri="{FF2B5EF4-FFF2-40B4-BE49-F238E27FC236}">
+                <a16:creationId xmlns:a16="http://schemas.microsoft.com/office/drawing/2014/main" id="{8C5601C0-B6FA-4F26-82B5-FFD48CA7DCDA}"/>
+              </a:ext>
+            </a:extLst>
+          </p:cNvPr>
+          <p:cNvSpPr txBox="1">
+            <a:spLocks/>
+          </p:cNvSpPr>
+          <p:nvPr/>
+        </p:nvSpPr>
+        <p:spPr>
+          <a:xfrm>
+            <a:off x="15803369" y="9420058"/>
+            <a:ext cx="1807844" cy="257122"/>
+          </a:xfrm>
+          <a:prstGeom prst="rect">
+            <a:avLst/>
+          </a:prstGeom>
+        </p:spPr>
+        <p:txBody>
+          <a:bodyPr vert="horz" wrap="square" lIns="0" tIns="10795" rIns="0" bIns="0" rtlCol="0">
+            <a:spAutoFit/>
+          </a:bodyPr>
+          <a:lstStyle>
+            <a:defPPr>
+              <a:defRPr lang="en-US"/>
+            </a:defPPr>
+            <a:lvl1pPr marL="12700">
+              <a:spcBef>
+                <a:spcPts val="85"/>
+              </a:spcBef>
+              <a:defRPr sz="1600" b="1" i="0"/>
+            </a:lvl1pPr>
+            <a:lvl2pPr marL="457200" algn="l" defTabSz="914400" rtl="0" eaLnBrk="1" latinLnBrk="0" hangingPunct="1">
+              <a:defRPr sz="1800" kern="1200">
+                <a:solidFill>
+                  <a:schemeClr val="tx1"/>
+                </a:solidFill>
+                <a:latin typeface="+mn-lt"/>
+                <a:ea typeface="+mn-ea"/>
+                <a:cs typeface="+mn-cs"/>
+              </a:defRPr>
+            </a:lvl2pPr>
+            <a:lvl3pPr marL="914400" algn="l" defTabSz="914400" rtl="0" eaLnBrk="1" latinLnBrk="0" hangingPunct="1">
+              <a:defRPr sz="1800" kern="1200">
+                <a:solidFill>
+                  <a:schemeClr val="tx1"/>
+                </a:solidFill>
+                <a:latin typeface="+mn-lt"/>
+                <a:ea typeface="+mn-ea"/>
+                <a:cs typeface="+mn-cs"/>
+              </a:defRPr>
+            </a:lvl3pPr>
+            <a:lvl4pPr marL="1371600" algn="l" defTabSz="914400" rtl="0" eaLnBrk="1" latinLnBrk="0" hangingPunct="1">
+              <a:defRPr sz="1800" kern="1200">
+                <a:solidFill>
+                  <a:schemeClr val="tx1"/>
+                </a:solidFill>
+                <a:latin typeface="+mn-lt"/>
+                <a:ea typeface="+mn-ea"/>
+                <a:cs typeface="+mn-cs"/>
+              </a:defRPr>
+            </a:lvl4pPr>
+            <a:lvl5pPr marL="1828800" algn="l" defTabSz="914400" rtl="0" eaLnBrk="1" latinLnBrk="0" hangingPunct="1">
+              <a:defRPr sz="1800" kern="1200">
+                <a:solidFill>
+                  <a:schemeClr val="tx1"/>
+                </a:solidFill>
+                <a:latin typeface="+mn-lt"/>
+                <a:ea typeface="+mn-ea"/>
+                <a:cs typeface="+mn-cs"/>
+              </a:defRPr>
+            </a:lvl5pPr>
+            <a:lvl6pPr marL="2286000" algn="l" defTabSz="914400" rtl="0" eaLnBrk="1" latinLnBrk="0" hangingPunct="1">
+              <a:defRPr sz="1800" kern="1200">
+                <a:solidFill>
+                  <a:schemeClr val="tx1"/>
+                </a:solidFill>
+                <a:latin typeface="+mn-lt"/>
+                <a:ea typeface="+mn-ea"/>
+                <a:cs typeface="+mn-cs"/>
+              </a:defRPr>
+            </a:lvl6pPr>
+            <a:lvl7pPr marL="2743200" algn="l" defTabSz="914400" rtl="0" eaLnBrk="1" latinLnBrk="0" hangingPunct="1">
+              <a:defRPr sz="1800" kern="1200">
+                <a:solidFill>
+                  <a:schemeClr val="tx1"/>
+                </a:solidFill>
+                <a:latin typeface="+mn-lt"/>
+                <a:ea typeface="+mn-ea"/>
+                <a:cs typeface="+mn-cs"/>
+              </a:defRPr>
+            </a:lvl7pPr>
+            <a:lvl8pPr marL="3200400" algn="l" defTabSz="914400" rtl="0" eaLnBrk="1" latinLnBrk="0" hangingPunct="1">
+              <a:defRPr sz="1800" kern="1200">
+                <a:solidFill>
+                  <a:schemeClr val="tx1"/>
+                </a:solidFill>
+                <a:latin typeface="+mn-lt"/>
+                <a:ea typeface="+mn-ea"/>
+                <a:cs typeface="+mn-cs"/>
+              </a:defRPr>
+            </a:lvl8pPr>
+            <a:lvl9pPr marL="3657600" algn="l" defTabSz="914400" rtl="0" eaLnBrk="1" latinLnBrk="0" hangingPunct="1">
+              <a:defRPr sz="1800" kern="1200">
+                <a:solidFill>
+                  <a:schemeClr val="tx1"/>
+                </a:solidFill>
+                <a:latin typeface="+mn-lt"/>
+                <a:ea typeface="+mn-ea"/>
+                <a:cs typeface="+mn-cs"/>
+              </a:defRPr>
+            </a:lvl9pPr>
+          </a:lstStyle>
+          <a:p>
+            <a:r>
+              <a:rPr lang="en-US" dirty="0"/>
+              <a:t>June,29 2021</a:t>
+            </a:r>
+          </a:p>
+        </p:txBody>
+      </p:sp>
     </p:spTree>
   </p:cSld>
   <p:clrMapOvr>
@@ -21508,108 +21753,6 @@
               <a:t>Thank You</a:t>
             </a:r>
             <a:endParaRPr spc="-465"/>
-          </a:p>
-        </p:txBody>
-      </p:sp>
-      <p:sp>
-        <p:nvSpPr>
-          <p:cNvPr id="8" name="object 8"/>
-          <p:cNvSpPr txBox="1">
-            <a:spLocks noGrp="1"/>
-          </p:cNvSpPr>
-          <p:nvPr>
-            <p:ph type="dt" sz="half" idx="6"/>
-          </p:nvPr>
-        </p:nvSpPr>
-        <p:spPr>
-          <a:prstGeom prst="rect">
-            <a:avLst/>
-          </a:prstGeom>
-        </p:spPr>
-        <p:txBody>
-          <a:bodyPr vert="horz" wrap="square" lIns="0" tIns="10795" rIns="0" bIns="0" rtlCol="0">
-            <a:spAutoFit/>
-          </a:bodyPr>
-          <a:lstStyle/>
-          <a:p>
-            <a:pPr marL="12700">
-              <a:lnSpc>
-                <a:spcPct val="100000"/>
-              </a:lnSpc>
-              <a:spcBef>
-                <a:spcPts val="85"/>
-              </a:spcBef>
-            </a:pPr>
-            <a:r>
-              <a:rPr spc="5"/>
-              <a:t>September,</a:t>
-            </a:r>
-            <a:r>
-              <a:rPr spc="-30"/>
-              <a:t> </a:t>
-            </a:r>
-            <a:r>
-              <a:rPr spc="-45"/>
-              <a:t>28</a:t>
-            </a:r>
-            <a:r>
-              <a:rPr spc="-30"/>
-              <a:t> </a:t>
-            </a:r>
-            <a:r>
-              <a:rPr spc="20"/>
-              <a:t>2020</a:t>
-            </a:r>
-          </a:p>
-        </p:txBody>
-      </p:sp>
-      <p:sp>
-        <p:nvSpPr>
-          <p:cNvPr id="5" name="object 5"/>
-          <p:cNvSpPr txBox="1"/>
-          <p:nvPr/>
-        </p:nvSpPr>
-        <p:spPr>
-          <a:xfrm>
-            <a:off x="17040535" y="825942"/>
-            <a:ext cx="231775" cy="299720"/>
-          </a:xfrm>
-          <a:prstGeom prst="rect">
-            <a:avLst/>
-          </a:prstGeom>
-        </p:spPr>
-        <p:txBody>
-          <a:bodyPr vert="horz" wrap="square" lIns="0" tIns="12065" rIns="0" bIns="0" rtlCol="0">
-            <a:spAutoFit/>
-          </a:bodyPr>
-          <a:lstStyle/>
-          <a:p>
-            <a:pPr marL="12700">
-              <a:lnSpc>
-                <a:spcPct val="100000"/>
-              </a:lnSpc>
-              <a:spcBef>
-                <a:spcPts val="95"/>
-              </a:spcBef>
-            </a:pPr>
-            <a:r>
-              <a:rPr sz="1800" b="1" spc="-395">
-                <a:latin typeface="Trebuchet MS"/>
-                <a:cs typeface="Trebuchet MS"/>
-              </a:rPr>
-              <a:t>1</a:t>
-            </a:r>
-            <a:r>
-              <a:rPr sz="1800" b="1" spc="-95">
-                <a:latin typeface="Trebuchet MS"/>
-                <a:cs typeface="Trebuchet MS"/>
-              </a:rPr>
-              <a:t>7</a:t>
-            </a:r>
-            <a:endParaRPr sz="1800">
-              <a:latin typeface="Trebuchet MS"/>
-              <a:cs typeface="Trebuchet MS"/>
-            </a:endParaRPr>
           </a:p>
         </p:txBody>
       </p:sp>

</xml_diff>